<commit_message>
fixed some tests and improved root metadata
</commit_message>
<xml_diff>
--- a/designs/sketches.pptx
+++ b/designs/sketches.pptx
@@ -10,6 +10,8 @@
     <p:sldId id="258" r:id="rId4"/>
     <p:sldId id="259" r:id="rId5"/>
     <p:sldId id="260" r:id="rId6"/>
+    <p:sldId id="261" r:id="rId7"/>
+    <p:sldId id="262" r:id="rId8"/>
   </p:sldIdLst>
   <p:sldSz cx="12192000" cy="6858000"/>
   <p:notesSz cx="6858000" cy="9144000"/>
@@ -263,7 +265,7 @@
           <a:p>
             <a:fld id="{B4622925-9F33-9A43-856A-4DCBC9210D60}" type="datetimeFigureOut">
               <a:rPr lang="en-US" smtClean="0"/>
-              <a:t>6/9/20</a:t>
+              <a:t>6/14/20</a:t>
             </a:fld>
             <a:endParaRPr lang="en-US"/>
           </a:p>
@@ -461,7 +463,7 @@
           <a:p>
             <a:fld id="{B4622925-9F33-9A43-856A-4DCBC9210D60}" type="datetimeFigureOut">
               <a:rPr lang="en-US" smtClean="0"/>
-              <a:t>6/9/20</a:t>
+              <a:t>6/14/20</a:t>
             </a:fld>
             <a:endParaRPr lang="en-US"/>
           </a:p>
@@ -669,7 +671,7 @@
           <a:p>
             <a:fld id="{B4622925-9F33-9A43-856A-4DCBC9210D60}" type="datetimeFigureOut">
               <a:rPr lang="en-US" smtClean="0"/>
-              <a:t>6/9/20</a:t>
+              <a:t>6/14/20</a:t>
             </a:fld>
             <a:endParaRPr lang="en-US"/>
           </a:p>
@@ -867,7 +869,7 @@
           <a:p>
             <a:fld id="{B4622925-9F33-9A43-856A-4DCBC9210D60}" type="datetimeFigureOut">
               <a:rPr lang="en-US" smtClean="0"/>
-              <a:t>6/9/20</a:t>
+              <a:t>6/14/20</a:t>
             </a:fld>
             <a:endParaRPr lang="en-US"/>
           </a:p>
@@ -1142,7 +1144,7 @@
           <a:p>
             <a:fld id="{B4622925-9F33-9A43-856A-4DCBC9210D60}" type="datetimeFigureOut">
               <a:rPr lang="en-US" smtClean="0"/>
-              <a:t>6/9/20</a:t>
+              <a:t>6/14/20</a:t>
             </a:fld>
             <a:endParaRPr lang="en-US"/>
           </a:p>
@@ -1407,7 +1409,7 @@
           <a:p>
             <a:fld id="{B4622925-9F33-9A43-856A-4DCBC9210D60}" type="datetimeFigureOut">
               <a:rPr lang="en-US" smtClean="0"/>
-              <a:t>6/9/20</a:t>
+              <a:t>6/14/20</a:t>
             </a:fld>
             <a:endParaRPr lang="en-US"/>
           </a:p>
@@ -1819,7 +1821,7 @@
           <a:p>
             <a:fld id="{B4622925-9F33-9A43-856A-4DCBC9210D60}" type="datetimeFigureOut">
               <a:rPr lang="en-US" smtClean="0"/>
-              <a:t>6/9/20</a:t>
+              <a:t>6/14/20</a:t>
             </a:fld>
             <a:endParaRPr lang="en-US"/>
           </a:p>
@@ -1960,7 +1962,7 @@
           <a:p>
             <a:fld id="{B4622925-9F33-9A43-856A-4DCBC9210D60}" type="datetimeFigureOut">
               <a:rPr lang="en-US" smtClean="0"/>
-              <a:t>6/9/20</a:t>
+              <a:t>6/14/20</a:t>
             </a:fld>
             <a:endParaRPr lang="en-US"/>
           </a:p>
@@ -2073,7 +2075,7 @@
           <a:p>
             <a:fld id="{B4622925-9F33-9A43-856A-4DCBC9210D60}" type="datetimeFigureOut">
               <a:rPr lang="en-US" smtClean="0"/>
-              <a:t>6/9/20</a:t>
+              <a:t>6/14/20</a:t>
             </a:fld>
             <a:endParaRPr lang="en-US"/>
           </a:p>
@@ -2384,7 +2386,7 @@
           <a:p>
             <a:fld id="{B4622925-9F33-9A43-856A-4DCBC9210D60}" type="datetimeFigureOut">
               <a:rPr lang="en-US" smtClean="0"/>
-              <a:t>6/9/20</a:t>
+              <a:t>6/14/20</a:t>
             </a:fld>
             <a:endParaRPr lang="en-US"/>
           </a:p>
@@ -2672,7 +2674,7 @@
           <a:p>
             <a:fld id="{B4622925-9F33-9A43-856A-4DCBC9210D60}" type="datetimeFigureOut">
               <a:rPr lang="en-US" smtClean="0"/>
-              <a:t>6/9/20</a:t>
+              <a:t>6/14/20</a:t>
             </a:fld>
             <a:endParaRPr lang="en-US"/>
           </a:p>
@@ -2913,7 +2915,7 @@
           <a:p>
             <a:fld id="{B4622925-9F33-9A43-856A-4DCBC9210D60}" type="datetimeFigureOut">
               <a:rPr lang="en-US" smtClean="0"/>
-              <a:t>6/9/20</a:t>
+              <a:t>6/14/20</a:t>
             </a:fld>
             <a:endParaRPr lang="en-US"/>
           </a:p>
@@ -7545,20 +7547,269 @@
       </p:sp>
       <p:sp>
         <p:nvSpPr>
-          <p:cNvPr id="25" name="Line Callout 1 24">
-            <a:extLst>
-              <a:ext uri="{FF2B5EF4-FFF2-40B4-BE49-F238E27FC236}">
-                <a16:creationId xmlns:a16="http://schemas.microsoft.com/office/drawing/2014/main" id="{73C00E9C-2069-6744-9D7E-A37C09EB0234}"/>
-              </a:ext>
-            </a:extLst>
-          </p:cNvPr>
-          <p:cNvSpPr/>
-          <p:nvPr/>
-        </p:nvSpPr>
-        <p:spPr>
-          <a:xfrm>
-            <a:off x="10218200" y="451921"/>
-            <a:ext cx="1195533" cy="385945"/>
+          <p:cNvPr id="34" name="Rectangle 33">
+            <a:extLst>
+              <a:ext uri="{FF2B5EF4-FFF2-40B4-BE49-F238E27FC236}">
+                <a16:creationId xmlns:a16="http://schemas.microsoft.com/office/drawing/2014/main" id="{74C85F1E-B964-D348-8C29-8A6A254B561E}"/>
+              </a:ext>
+            </a:extLst>
+          </p:cNvPr>
+          <p:cNvSpPr/>
+          <p:nvPr/>
+        </p:nvSpPr>
+        <p:spPr>
+          <a:xfrm>
+            <a:off x="2811698" y="1646546"/>
+            <a:ext cx="2466315" cy="3447766"/>
+          </a:xfrm>
+          <a:prstGeom prst="rect">
+            <a:avLst/>
+          </a:prstGeom>
+          <a:solidFill>
+            <a:schemeClr val="bg1">
+              <a:lumMod val="95000"/>
+            </a:schemeClr>
+          </a:solidFill>
+        </p:spPr>
+        <p:style>
+          <a:lnRef idx="2">
+            <a:schemeClr val="accent1">
+              <a:shade val="50000"/>
+            </a:schemeClr>
+          </a:lnRef>
+          <a:fillRef idx="1">
+            <a:schemeClr val="accent1"/>
+          </a:fillRef>
+          <a:effectRef idx="0">
+            <a:schemeClr val="accent1"/>
+          </a:effectRef>
+          <a:fontRef idx="minor">
+            <a:schemeClr val="lt1"/>
+          </a:fontRef>
+        </p:style>
+        <p:txBody>
+          <a:bodyPr rtlCol="0" anchor="ctr"/>
+          <a:lstStyle/>
+          <a:p>
+            <a:pPr algn="ctr"/>
+            <a:endParaRPr lang="en-US"/>
+          </a:p>
+        </p:txBody>
+      </p:sp>
+      <p:sp>
+        <p:nvSpPr>
+          <p:cNvPr id="36" name="Rectangle 35">
+            <a:extLst>
+              <a:ext uri="{FF2B5EF4-FFF2-40B4-BE49-F238E27FC236}">
+                <a16:creationId xmlns:a16="http://schemas.microsoft.com/office/drawing/2014/main" id="{ABE50C39-D2A7-314C-8EAA-182EB48AF90B}"/>
+              </a:ext>
+            </a:extLst>
+          </p:cNvPr>
+          <p:cNvSpPr/>
+          <p:nvPr/>
+        </p:nvSpPr>
+        <p:spPr>
+          <a:xfrm>
+            <a:off x="2813625" y="1493134"/>
+            <a:ext cx="2466315" cy="152400"/>
+          </a:xfrm>
+          <a:prstGeom prst="rect">
+            <a:avLst/>
+          </a:prstGeom>
+          <a:solidFill>
+            <a:srgbClr val="FF8F7D"/>
+          </a:solidFill>
+        </p:spPr>
+        <p:style>
+          <a:lnRef idx="2">
+            <a:schemeClr val="accent1">
+              <a:shade val="50000"/>
+            </a:schemeClr>
+          </a:lnRef>
+          <a:fillRef idx="1">
+            <a:schemeClr val="accent1"/>
+          </a:fillRef>
+          <a:effectRef idx="0">
+            <a:schemeClr val="accent1"/>
+          </a:effectRef>
+          <a:fontRef idx="minor">
+            <a:schemeClr val="lt1"/>
+          </a:fontRef>
+        </p:style>
+        <p:txBody>
+          <a:bodyPr rtlCol="0" anchor="ctr"/>
+          <a:lstStyle/>
+          <a:p>
+            <a:pPr algn="ctr"/>
+            <a:endParaRPr lang="en-US"/>
+          </a:p>
+        </p:txBody>
+      </p:sp>
+      <p:sp>
+        <p:nvSpPr>
+          <p:cNvPr id="38" name="Rectangle 37">
+            <a:extLst>
+              <a:ext uri="{FF2B5EF4-FFF2-40B4-BE49-F238E27FC236}">
+                <a16:creationId xmlns:a16="http://schemas.microsoft.com/office/drawing/2014/main" id="{9CD0C780-9EF2-354B-B04D-96FE94C03552}"/>
+              </a:ext>
+            </a:extLst>
+          </p:cNvPr>
+          <p:cNvSpPr/>
+          <p:nvPr/>
+        </p:nvSpPr>
+        <p:spPr>
+          <a:xfrm>
+            <a:off x="2811697" y="5094312"/>
+            <a:ext cx="2466315" cy="152400"/>
+          </a:xfrm>
+          <a:prstGeom prst="rect">
+            <a:avLst/>
+          </a:prstGeom>
+          <a:solidFill>
+            <a:srgbClr val="FF8F7D"/>
+          </a:solidFill>
+        </p:spPr>
+        <p:style>
+          <a:lnRef idx="2">
+            <a:schemeClr val="accent1">
+              <a:shade val="50000"/>
+            </a:schemeClr>
+          </a:lnRef>
+          <a:fillRef idx="1">
+            <a:schemeClr val="accent1"/>
+          </a:fillRef>
+          <a:effectRef idx="0">
+            <a:schemeClr val="accent1"/>
+          </a:effectRef>
+          <a:fontRef idx="minor">
+            <a:schemeClr val="lt1"/>
+          </a:fontRef>
+        </p:style>
+        <p:txBody>
+          <a:bodyPr rtlCol="0" anchor="ctr"/>
+          <a:lstStyle/>
+          <a:p>
+            <a:pPr algn="ctr"/>
+            <a:endParaRPr lang="en-US"/>
+          </a:p>
+        </p:txBody>
+      </p:sp>
+      <p:sp>
+        <p:nvSpPr>
+          <p:cNvPr id="39" name="Rectangle 38">
+            <a:extLst>
+              <a:ext uri="{FF2B5EF4-FFF2-40B4-BE49-F238E27FC236}">
+                <a16:creationId xmlns:a16="http://schemas.microsoft.com/office/drawing/2014/main" id="{0654EF2D-BF03-F643-83B4-A04CACA07848}"/>
+              </a:ext>
+            </a:extLst>
+          </p:cNvPr>
+          <p:cNvSpPr/>
+          <p:nvPr/>
+        </p:nvSpPr>
+        <p:spPr>
+          <a:xfrm>
+            <a:off x="7858422" y="5036325"/>
+            <a:ext cx="3080894" cy="190376"/>
+          </a:xfrm>
+          <a:prstGeom prst="rect">
+            <a:avLst/>
+          </a:prstGeom>
+          <a:solidFill>
+            <a:srgbClr val="FF8F7D"/>
+          </a:solidFill>
+        </p:spPr>
+        <p:style>
+          <a:lnRef idx="2">
+            <a:schemeClr val="accent1">
+              <a:shade val="50000"/>
+            </a:schemeClr>
+          </a:lnRef>
+          <a:fillRef idx="1">
+            <a:schemeClr val="accent1"/>
+          </a:fillRef>
+          <a:effectRef idx="0">
+            <a:schemeClr val="accent1"/>
+          </a:effectRef>
+          <a:fontRef idx="minor">
+            <a:schemeClr val="lt1"/>
+          </a:fontRef>
+        </p:style>
+        <p:txBody>
+          <a:bodyPr rtlCol="0" anchor="ctr"/>
+          <a:lstStyle/>
+          <a:p>
+            <a:pPr algn="ctr"/>
+            <a:endParaRPr lang="en-US"/>
+          </a:p>
+        </p:txBody>
+      </p:sp>
+      <p:sp>
+        <p:nvSpPr>
+          <p:cNvPr id="20" name="Rectangle 19">
+            <a:extLst>
+              <a:ext uri="{FF2B5EF4-FFF2-40B4-BE49-F238E27FC236}">
+                <a16:creationId xmlns:a16="http://schemas.microsoft.com/office/drawing/2014/main" id="{D6D768A8-5BD0-B949-847B-38A3092EDF71}"/>
+              </a:ext>
+            </a:extLst>
+          </p:cNvPr>
+          <p:cNvSpPr/>
+          <p:nvPr/>
+        </p:nvSpPr>
+        <p:spPr>
+          <a:xfrm>
+            <a:off x="7844270" y="1646545"/>
+            <a:ext cx="3095046" cy="3447767"/>
+          </a:xfrm>
+          <a:prstGeom prst="rect">
+            <a:avLst/>
+          </a:prstGeom>
+          <a:solidFill>
+            <a:schemeClr val="bg1">
+              <a:lumMod val="95000"/>
+            </a:schemeClr>
+          </a:solidFill>
+        </p:spPr>
+        <p:style>
+          <a:lnRef idx="2">
+            <a:schemeClr val="accent1">
+              <a:shade val="50000"/>
+            </a:schemeClr>
+          </a:lnRef>
+          <a:fillRef idx="1">
+            <a:schemeClr val="accent1"/>
+          </a:fillRef>
+          <a:effectRef idx="0">
+            <a:schemeClr val="accent1"/>
+          </a:effectRef>
+          <a:fontRef idx="minor">
+            <a:schemeClr val="lt1"/>
+          </a:fontRef>
+        </p:style>
+        <p:txBody>
+          <a:bodyPr rtlCol="0" anchor="ctr"/>
+          <a:lstStyle/>
+          <a:p>
+            <a:pPr algn="ctr"/>
+            <a:endParaRPr lang="en-US"/>
+          </a:p>
+        </p:txBody>
+      </p:sp>
+      <p:sp>
+        <p:nvSpPr>
+          <p:cNvPr id="30" name="Line Callout 1 29">
+            <a:extLst>
+              <a:ext uri="{FF2B5EF4-FFF2-40B4-BE49-F238E27FC236}">
+                <a16:creationId xmlns:a16="http://schemas.microsoft.com/office/drawing/2014/main" id="{497EF891-63A4-1E42-8D27-AD42FF10C3DC}"/>
+              </a:ext>
+            </a:extLst>
+          </p:cNvPr>
+          <p:cNvSpPr/>
+          <p:nvPr/>
+        </p:nvSpPr>
+        <p:spPr>
+          <a:xfrm>
+            <a:off x="10785601" y="2092836"/>
+            <a:ext cx="1086848" cy="241525"/>
           </a:xfrm>
           <a:prstGeom prst="borderCallout1">
             <a:avLst>
@@ -7600,276 +7851,27 @@
             <a:pPr algn="ctr"/>
             <a:r>
               <a:rPr lang="en-US" sz="1200" dirty="0"/>
-              <a:t>Writing area tool bar</a:t>
-            </a:r>
-          </a:p>
-        </p:txBody>
-      </p:sp>
-      <p:sp>
-        <p:nvSpPr>
-          <p:cNvPr id="34" name="Rectangle 33">
-            <a:extLst>
-              <a:ext uri="{FF2B5EF4-FFF2-40B4-BE49-F238E27FC236}">
-                <a16:creationId xmlns:a16="http://schemas.microsoft.com/office/drawing/2014/main" id="{74C85F1E-B964-D348-8C29-8A6A254B561E}"/>
-              </a:ext>
-            </a:extLst>
-          </p:cNvPr>
-          <p:cNvSpPr/>
-          <p:nvPr/>
-        </p:nvSpPr>
-        <p:spPr>
-          <a:xfrm>
-            <a:off x="2811698" y="1646546"/>
-            <a:ext cx="2466315" cy="3447766"/>
-          </a:xfrm>
-          <a:prstGeom prst="rect">
-            <a:avLst/>
-          </a:prstGeom>
-          <a:solidFill>
-            <a:schemeClr val="bg1">
-              <a:lumMod val="95000"/>
-            </a:schemeClr>
-          </a:solidFill>
-        </p:spPr>
-        <p:style>
-          <a:lnRef idx="2">
-            <a:schemeClr val="accent1">
-              <a:shade val="50000"/>
-            </a:schemeClr>
-          </a:lnRef>
-          <a:fillRef idx="1">
-            <a:schemeClr val="accent1"/>
-          </a:fillRef>
-          <a:effectRef idx="0">
-            <a:schemeClr val="accent1"/>
-          </a:effectRef>
-          <a:fontRef idx="minor">
-            <a:schemeClr val="lt1"/>
-          </a:fontRef>
-        </p:style>
-        <p:txBody>
-          <a:bodyPr rtlCol="0" anchor="ctr"/>
-          <a:lstStyle/>
-          <a:p>
-            <a:pPr algn="ctr"/>
-            <a:endParaRPr lang="en-US"/>
-          </a:p>
-        </p:txBody>
-      </p:sp>
-      <p:sp>
-        <p:nvSpPr>
-          <p:cNvPr id="36" name="Rectangle 35">
-            <a:extLst>
-              <a:ext uri="{FF2B5EF4-FFF2-40B4-BE49-F238E27FC236}">
-                <a16:creationId xmlns:a16="http://schemas.microsoft.com/office/drawing/2014/main" id="{ABE50C39-D2A7-314C-8EAA-182EB48AF90B}"/>
-              </a:ext>
-            </a:extLst>
-          </p:cNvPr>
-          <p:cNvSpPr/>
-          <p:nvPr/>
-        </p:nvSpPr>
-        <p:spPr>
-          <a:xfrm>
-            <a:off x="2813625" y="1493134"/>
-            <a:ext cx="2466315" cy="152400"/>
-          </a:xfrm>
-          <a:prstGeom prst="rect">
-            <a:avLst/>
-          </a:prstGeom>
-          <a:solidFill>
-            <a:srgbClr val="FF8F7D"/>
-          </a:solidFill>
-        </p:spPr>
-        <p:style>
-          <a:lnRef idx="2">
-            <a:schemeClr val="accent1">
-              <a:shade val="50000"/>
-            </a:schemeClr>
-          </a:lnRef>
-          <a:fillRef idx="1">
-            <a:schemeClr val="accent1"/>
-          </a:fillRef>
-          <a:effectRef idx="0">
-            <a:schemeClr val="accent1"/>
-          </a:effectRef>
-          <a:fontRef idx="minor">
-            <a:schemeClr val="lt1"/>
-          </a:fontRef>
-        </p:style>
-        <p:txBody>
-          <a:bodyPr rtlCol="0" anchor="ctr"/>
-          <a:lstStyle/>
-          <a:p>
-            <a:pPr algn="ctr"/>
-            <a:endParaRPr lang="en-US"/>
-          </a:p>
-        </p:txBody>
-      </p:sp>
-      <p:sp>
-        <p:nvSpPr>
-          <p:cNvPr id="38" name="Rectangle 37">
-            <a:extLst>
-              <a:ext uri="{FF2B5EF4-FFF2-40B4-BE49-F238E27FC236}">
-                <a16:creationId xmlns:a16="http://schemas.microsoft.com/office/drawing/2014/main" id="{9CD0C780-9EF2-354B-B04D-96FE94C03552}"/>
-              </a:ext>
-            </a:extLst>
-          </p:cNvPr>
-          <p:cNvSpPr/>
-          <p:nvPr/>
-        </p:nvSpPr>
-        <p:spPr>
-          <a:xfrm>
-            <a:off x="2811697" y="5094312"/>
-            <a:ext cx="2466315" cy="152400"/>
-          </a:xfrm>
-          <a:prstGeom prst="rect">
-            <a:avLst/>
-          </a:prstGeom>
-          <a:solidFill>
-            <a:srgbClr val="FF8F7D"/>
-          </a:solidFill>
-        </p:spPr>
-        <p:style>
-          <a:lnRef idx="2">
-            <a:schemeClr val="accent1">
-              <a:shade val="50000"/>
-            </a:schemeClr>
-          </a:lnRef>
-          <a:fillRef idx="1">
-            <a:schemeClr val="accent1"/>
-          </a:fillRef>
-          <a:effectRef idx="0">
-            <a:schemeClr val="accent1"/>
-          </a:effectRef>
-          <a:fontRef idx="minor">
-            <a:schemeClr val="lt1"/>
-          </a:fontRef>
-        </p:style>
-        <p:txBody>
-          <a:bodyPr rtlCol="0" anchor="ctr"/>
-          <a:lstStyle/>
-          <a:p>
-            <a:pPr algn="ctr"/>
-            <a:endParaRPr lang="en-US"/>
-          </a:p>
-        </p:txBody>
-      </p:sp>
-      <p:sp>
-        <p:nvSpPr>
-          <p:cNvPr id="39" name="Rectangle 38">
-            <a:extLst>
-              <a:ext uri="{FF2B5EF4-FFF2-40B4-BE49-F238E27FC236}">
-                <a16:creationId xmlns:a16="http://schemas.microsoft.com/office/drawing/2014/main" id="{0654EF2D-BF03-F643-83B4-A04CACA07848}"/>
-              </a:ext>
-            </a:extLst>
-          </p:cNvPr>
-          <p:cNvSpPr/>
-          <p:nvPr/>
-        </p:nvSpPr>
-        <p:spPr>
-          <a:xfrm>
-            <a:off x="7858422" y="5036325"/>
-            <a:ext cx="3080894" cy="190376"/>
-          </a:xfrm>
-          <a:prstGeom prst="rect">
-            <a:avLst/>
-          </a:prstGeom>
-          <a:solidFill>
-            <a:srgbClr val="FF8F7D"/>
-          </a:solidFill>
-        </p:spPr>
-        <p:style>
-          <a:lnRef idx="2">
-            <a:schemeClr val="accent1">
-              <a:shade val="50000"/>
-            </a:schemeClr>
-          </a:lnRef>
-          <a:fillRef idx="1">
-            <a:schemeClr val="accent1"/>
-          </a:fillRef>
-          <a:effectRef idx="0">
-            <a:schemeClr val="accent1"/>
-          </a:effectRef>
-          <a:fontRef idx="minor">
-            <a:schemeClr val="lt1"/>
-          </a:fontRef>
-        </p:style>
-        <p:txBody>
-          <a:bodyPr rtlCol="0" anchor="ctr"/>
-          <a:lstStyle/>
-          <a:p>
-            <a:pPr algn="ctr"/>
-            <a:endParaRPr lang="en-US"/>
-          </a:p>
-        </p:txBody>
-      </p:sp>
-      <p:sp>
-        <p:nvSpPr>
-          <p:cNvPr id="20" name="Rectangle 19">
-            <a:extLst>
-              <a:ext uri="{FF2B5EF4-FFF2-40B4-BE49-F238E27FC236}">
-                <a16:creationId xmlns:a16="http://schemas.microsoft.com/office/drawing/2014/main" id="{D6D768A8-5BD0-B949-847B-38A3092EDF71}"/>
-              </a:ext>
-            </a:extLst>
-          </p:cNvPr>
-          <p:cNvSpPr/>
-          <p:nvPr/>
-        </p:nvSpPr>
-        <p:spPr>
-          <a:xfrm>
-            <a:off x="7844270" y="1646545"/>
-            <a:ext cx="3095046" cy="3447767"/>
-          </a:xfrm>
-          <a:prstGeom prst="rect">
-            <a:avLst/>
-          </a:prstGeom>
-          <a:solidFill>
-            <a:schemeClr val="bg1">
-              <a:lumMod val="95000"/>
-            </a:schemeClr>
-          </a:solidFill>
-        </p:spPr>
-        <p:style>
-          <a:lnRef idx="2">
-            <a:schemeClr val="accent1">
-              <a:shade val="50000"/>
-            </a:schemeClr>
-          </a:lnRef>
-          <a:fillRef idx="1">
-            <a:schemeClr val="accent1"/>
-          </a:fillRef>
-          <a:effectRef idx="0">
-            <a:schemeClr val="accent1"/>
-          </a:effectRef>
-          <a:fontRef idx="minor">
-            <a:schemeClr val="lt1"/>
-          </a:fontRef>
-        </p:style>
-        <p:txBody>
-          <a:bodyPr rtlCol="0" anchor="ctr"/>
-          <a:lstStyle/>
-          <a:p>
-            <a:pPr algn="ctr"/>
-            <a:endParaRPr lang="en-US"/>
-          </a:p>
-        </p:txBody>
-      </p:sp>
-      <p:sp>
-        <p:nvSpPr>
-          <p:cNvPr id="30" name="Line Callout 1 29">
-            <a:extLst>
-              <a:ext uri="{FF2B5EF4-FFF2-40B4-BE49-F238E27FC236}">
-                <a16:creationId xmlns:a16="http://schemas.microsoft.com/office/drawing/2014/main" id="{497EF891-63A4-1E42-8D27-AD42FF10C3DC}"/>
-              </a:ext>
-            </a:extLst>
-          </p:cNvPr>
-          <p:cNvSpPr/>
-          <p:nvPr/>
-        </p:nvSpPr>
-        <p:spPr>
-          <a:xfrm>
-            <a:off x="10785601" y="2092836"/>
-            <a:ext cx="1086848" cy="241525"/>
+              <a:t>Writing area</a:t>
+            </a:r>
+          </a:p>
+        </p:txBody>
+      </p:sp>
+      <p:sp>
+        <p:nvSpPr>
+          <p:cNvPr id="40" name="Line Callout 1 39">
+            <a:extLst>
+              <a:ext uri="{FF2B5EF4-FFF2-40B4-BE49-F238E27FC236}">
+                <a16:creationId xmlns:a16="http://schemas.microsoft.com/office/drawing/2014/main" id="{13A0F9F6-2457-E64B-9F4D-F9540793B366}"/>
+              </a:ext>
+            </a:extLst>
+          </p:cNvPr>
+          <p:cNvSpPr/>
+          <p:nvPr/>
+        </p:nvSpPr>
+        <p:spPr>
+          <a:xfrm>
+            <a:off x="10370600" y="4030428"/>
+            <a:ext cx="1195533" cy="385945"/>
           </a:xfrm>
           <a:prstGeom prst="borderCallout1">
             <a:avLst>
@@ -7911,27 +7913,1743 @@
             <a:pPr algn="ctr"/>
             <a:r>
               <a:rPr lang="en-US" sz="1200" dirty="0"/>
-              <a:t>Writing area</a:t>
-            </a:r>
-          </a:p>
-        </p:txBody>
-      </p:sp>
-      <p:sp>
-        <p:nvSpPr>
-          <p:cNvPr id="40" name="Line Callout 1 39">
-            <a:extLst>
-              <a:ext uri="{FF2B5EF4-FFF2-40B4-BE49-F238E27FC236}">
-                <a16:creationId xmlns:a16="http://schemas.microsoft.com/office/drawing/2014/main" id="{13A0F9F6-2457-E64B-9F4D-F9540793B366}"/>
-              </a:ext>
-            </a:extLst>
-          </p:cNvPr>
-          <p:cNvSpPr/>
-          <p:nvPr/>
-        </p:nvSpPr>
-        <p:spPr>
-          <a:xfrm>
-            <a:off x="10370600" y="4030428"/>
-            <a:ext cx="1195533" cy="385945"/>
+              <a:t>Writing area info bar</a:t>
+            </a:r>
+          </a:p>
+        </p:txBody>
+      </p:sp>
+      <p:sp>
+        <p:nvSpPr>
+          <p:cNvPr id="41" name="Rectangle 40">
+            <a:extLst>
+              <a:ext uri="{FF2B5EF4-FFF2-40B4-BE49-F238E27FC236}">
+                <a16:creationId xmlns:a16="http://schemas.microsoft.com/office/drawing/2014/main" id="{1CC1F401-371C-4243-BD18-C1181FD8DE81}"/>
+              </a:ext>
+            </a:extLst>
+          </p:cNvPr>
+          <p:cNvSpPr/>
+          <p:nvPr/>
+        </p:nvSpPr>
+        <p:spPr>
+          <a:xfrm>
+            <a:off x="1873074" y="1483483"/>
+            <a:ext cx="850392" cy="0"/>
+          </a:xfrm>
+          <a:prstGeom prst="rect">
+            <a:avLst/>
+          </a:prstGeom>
+          <a:solidFill>
+            <a:schemeClr val="accent5">
+              <a:lumMod val="40000"/>
+              <a:lumOff val="60000"/>
+            </a:schemeClr>
+          </a:solidFill>
+        </p:spPr>
+        <p:style>
+          <a:lnRef idx="2">
+            <a:schemeClr val="accent1">
+              <a:shade val="50000"/>
+            </a:schemeClr>
+          </a:lnRef>
+          <a:fillRef idx="1">
+            <a:schemeClr val="accent1"/>
+          </a:fillRef>
+          <a:effectRef idx="0">
+            <a:schemeClr val="accent1"/>
+          </a:effectRef>
+          <a:fontRef idx="minor">
+            <a:schemeClr val="lt1"/>
+          </a:fontRef>
+        </p:style>
+        <p:txBody>
+          <a:bodyPr rtlCol="0" anchor="ctr"/>
+          <a:lstStyle/>
+          <a:p>
+            <a:pPr algn="ctr"/>
+            <a:endParaRPr lang="en-US"/>
+          </a:p>
+        </p:txBody>
+      </p:sp>
+      <p:sp>
+        <p:nvSpPr>
+          <p:cNvPr id="42" name="Rectangle 41">
+            <a:extLst>
+              <a:ext uri="{FF2B5EF4-FFF2-40B4-BE49-F238E27FC236}">
+                <a16:creationId xmlns:a16="http://schemas.microsoft.com/office/drawing/2014/main" id="{41E76363-77A7-544B-8ED4-4543BA5BEA30}"/>
+              </a:ext>
+            </a:extLst>
+          </p:cNvPr>
+          <p:cNvSpPr/>
+          <p:nvPr/>
+        </p:nvSpPr>
+        <p:spPr>
+          <a:xfrm>
+            <a:off x="1875001" y="1608875"/>
+            <a:ext cx="850392" cy="0"/>
+          </a:xfrm>
+          <a:prstGeom prst="rect">
+            <a:avLst/>
+          </a:prstGeom>
+          <a:solidFill>
+            <a:schemeClr val="accent5">
+              <a:lumMod val="40000"/>
+              <a:lumOff val="60000"/>
+            </a:schemeClr>
+          </a:solidFill>
+        </p:spPr>
+        <p:style>
+          <a:lnRef idx="2">
+            <a:schemeClr val="accent1">
+              <a:shade val="50000"/>
+            </a:schemeClr>
+          </a:lnRef>
+          <a:fillRef idx="1">
+            <a:schemeClr val="accent1"/>
+          </a:fillRef>
+          <a:effectRef idx="0">
+            <a:schemeClr val="accent1"/>
+          </a:effectRef>
+          <a:fontRef idx="minor">
+            <a:schemeClr val="lt1"/>
+          </a:fontRef>
+        </p:style>
+        <p:txBody>
+          <a:bodyPr rtlCol="0" anchor="ctr"/>
+          <a:lstStyle/>
+          <a:p>
+            <a:pPr algn="ctr"/>
+            <a:endParaRPr lang="en-US"/>
+          </a:p>
+        </p:txBody>
+      </p:sp>
+      <p:sp>
+        <p:nvSpPr>
+          <p:cNvPr id="43" name="Rectangle 42">
+            <a:extLst>
+              <a:ext uri="{FF2B5EF4-FFF2-40B4-BE49-F238E27FC236}">
+                <a16:creationId xmlns:a16="http://schemas.microsoft.com/office/drawing/2014/main" id="{BE7D5406-6E75-464E-9DD6-166C5D35C21D}"/>
+              </a:ext>
+            </a:extLst>
+          </p:cNvPr>
+          <p:cNvSpPr/>
+          <p:nvPr/>
+        </p:nvSpPr>
+        <p:spPr>
+          <a:xfrm>
+            <a:off x="1865207" y="1738125"/>
+            <a:ext cx="850392" cy="0"/>
+          </a:xfrm>
+          <a:prstGeom prst="rect">
+            <a:avLst/>
+          </a:prstGeom>
+          <a:solidFill>
+            <a:schemeClr val="accent5">
+              <a:lumMod val="40000"/>
+              <a:lumOff val="60000"/>
+            </a:schemeClr>
+          </a:solidFill>
+        </p:spPr>
+        <p:style>
+          <a:lnRef idx="2">
+            <a:schemeClr val="accent1">
+              <a:shade val="50000"/>
+            </a:schemeClr>
+          </a:lnRef>
+          <a:fillRef idx="1">
+            <a:schemeClr val="accent1"/>
+          </a:fillRef>
+          <a:effectRef idx="0">
+            <a:schemeClr val="accent1"/>
+          </a:effectRef>
+          <a:fontRef idx="minor">
+            <a:schemeClr val="lt1"/>
+          </a:fontRef>
+        </p:style>
+        <p:txBody>
+          <a:bodyPr rtlCol="0" anchor="ctr"/>
+          <a:lstStyle/>
+          <a:p>
+            <a:pPr algn="ctr"/>
+            <a:endParaRPr lang="en-US"/>
+          </a:p>
+        </p:txBody>
+      </p:sp>
+      <p:sp>
+        <p:nvSpPr>
+          <p:cNvPr id="44" name="Rectangle 43">
+            <a:extLst>
+              <a:ext uri="{FF2B5EF4-FFF2-40B4-BE49-F238E27FC236}">
+                <a16:creationId xmlns:a16="http://schemas.microsoft.com/office/drawing/2014/main" id="{A0551A75-47FF-C74F-A9AE-654A6387D375}"/>
+              </a:ext>
+            </a:extLst>
+          </p:cNvPr>
+          <p:cNvSpPr/>
+          <p:nvPr/>
+        </p:nvSpPr>
+        <p:spPr>
+          <a:xfrm>
+            <a:off x="1878858" y="1851942"/>
+            <a:ext cx="839472" cy="3385609"/>
+          </a:xfrm>
+          <a:prstGeom prst="rect">
+            <a:avLst/>
+          </a:prstGeom>
+          <a:solidFill>
+            <a:schemeClr val="accent5">
+              <a:lumMod val="40000"/>
+              <a:lumOff val="60000"/>
+            </a:schemeClr>
+          </a:solidFill>
+        </p:spPr>
+        <p:style>
+          <a:lnRef idx="2">
+            <a:schemeClr val="accent1">
+              <a:shade val="50000"/>
+            </a:schemeClr>
+          </a:lnRef>
+          <a:fillRef idx="1">
+            <a:schemeClr val="accent1"/>
+          </a:fillRef>
+          <a:effectRef idx="0">
+            <a:schemeClr val="accent1"/>
+          </a:effectRef>
+          <a:fontRef idx="minor">
+            <a:schemeClr val="lt1"/>
+          </a:fontRef>
+        </p:style>
+        <p:txBody>
+          <a:bodyPr rtlCol="0" anchor="ctr"/>
+          <a:lstStyle/>
+          <a:p>
+            <a:pPr algn="ctr"/>
+            <a:endParaRPr lang="en-US"/>
+          </a:p>
+        </p:txBody>
+      </p:sp>
+      <p:sp>
+        <p:nvSpPr>
+          <p:cNvPr id="2" name="Oval 1">
+            <a:extLst>
+              <a:ext uri="{FF2B5EF4-FFF2-40B4-BE49-F238E27FC236}">
+                <a16:creationId xmlns:a16="http://schemas.microsoft.com/office/drawing/2014/main" id="{265887E1-D3A2-D849-A944-6BE597620217}"/>
+              </a:ext>
+            </a:extLst>
+          </p:cNvPr>
+          <p:cNvSpPr/>
+          <p:nvPr/>
+        </p:nvSpPr>
+        <p:spPr>
+          <a:xfrm>
+            <a:off x="1951934" y="1979582"/>
+            <a:ext cx="108354" cy="108354"/>
+          </a:xfrm>
+          <a:prstGeom prst="ellipse">
+            <a:avLst/>
+          </a:prstGeom>
+          <a:ln>
+            <a:solidFill>
+              <a:schemeClr val="accent1">
+                <a:lumMod val="50000"/>
+              </a:schemeClr>
+            </a:solidFill>
+          </a:ln>
+        </p:spPr>
+        <p:style>
+          <a:lnRef idx="2">
+            <a:schemeClr val="accent1">
+              <a:shade val="50000"/>
+            </a:schemeClr>
+          </a:lnRef>
+          <a:fillRef idx="1">
+            <a:schemeClr val="accent1"/>
+          </a:fillRef>
+          <a:effectRef idx="0">
+            <a:schemeClr val="accent1"/>
+          </a:effectRef>
+          <a:fontRef idx="minor">
+            <a:schemeClr val="lt1"/>
+          </a:fontRef>
+        </p:style>
+        <p:txBody>
+          <a:bodyPr rtlCol="0" anchor="ctr"/>
+          <a:lstStyle/>
+          <a:p>
+            <a:pPr algn="ctr"/>
+            <a:endParaRPr lang="en-US"/>
+          </a:p>
+        </p:txBody>
+      </p:sp>
+      <p:cxnSp>
+        <p:nvCxnSpPr>
+          <p:cNvPr id="8" name="Straight Connector 7">
+            <a:extLst>
+              <a:ext uri="{FF2B5EF4-FFF2-40B4-BE49-F238E27FC236}">
+                <a16:creationId xmlns:a16="http://schemas.microsoft.com/office/drawing/2014/main" id="{6C81C622-CC3A-4E4B-9AE8-F17520CC221C}"/>
+              </a:ext>
+            </a:extLst>
+          </p:cNvPr>
+          <p:cNvCxnSpPr>
+            <a:cxnSpLocks/>
+          </p:cNvCxnSpPr>
+          <p:nvPr/>
+        </p:nvCxnSpPr>
+        <p:spPr>
+          <a:xfrm>
+            <a:off x="2064153" y="2037149"/>
+            <a:ext cx="162046" cy="0"/>
+          </a:xfrm>
+          <a:prstGeom prst="line">
+            <a:avLst/>
+          </a:prstGeom>
+          <a:ln w="19050">
+            <a:solidFill>
+              <a:schemeClr val="accent1">
+                <a:lumMod val="50000"/>
+              </a:schemeClr>
+            </a:solidFill>
+          </a:ln>
+        </p:spPr>
+        <p:style>
+          <a:lnRef idx="1">
+            <a:schemeClr val="accent1"/>
+          </a:lnRef>
+          <a:fillRef idx="0">
+            <a:schemeClr val="accent1"/>
+          </a:fillRef>
+          <a:effectRef idx="0">
+            <a:schemeClr val="accent1"/>
+          </a:effectRef>
+          <a:fontRef idx="minor">
+            <a:schemeClr val="tx1"/>
+          </a:fontRef>
+        </p:style>
+      </p:cxnSp>
+      <p:sp>
+        <p:nvSpPr>
+          <p:cNvPr id="45" name="Oval 44">
+            <a:extLst>
+              <a:ext uri="{FF2B5EF4-FFF2-40B4-BE49-F238E27FC236}">
+                <a16:creationId xmlns:a16="http://schemas.microsoft.com/office/drawing/2014/main" id="{D01B33E0-1BAB-D84B-B4ED-13C644B9D7A2}"/>
+              </a:ext>
+            </a:extLst>
+          </p:cNvPr>
+          <p:cNvSpPr/>
+          <p:nvPr/>
+        </p:nvSpPr>
+        <p:spPr>
+          <a:xfrm>
+            <a:off x="1953866" y="2131982"/>
+            <a:ext cx="108354" cy="108354"/>
+          </a:xfrm>
+          <a:prstGeom prst="ellipse">
+            <a:avLst/>
+          </a:prstGeom>
+          <a:ln>
+            <a:solidFill>
+              <a:schemeClr val="accent1">
+                <a:lumMod val="50000"/>
+              </a:schemeClr>
+            </a:solidFill>
+          </a:ln>
+        </p:spPr>
+        <p:style>
+          <a:lnRef idx="2">
+            <a:schemeClr val="accent1">
+              <a:shade val="50000"/>
+            </a:schemeClr>
+          </a:lnRef>
+          <a:fillRef idx="1">
+            <a:schemeClr val="accent1"/>
+          </a:fillRef>
+          <a:effectRef idx="0">
+            <a:schemeClr val="accent1"/>
+          </a:effectRef>
+          <a:fontRef idx="minor">
+            <a:schemeClr val="lt1"/>
+          </a:fontRef>
+        </p:style>
+        <p:txBody>
+          <a:bodyPr rtlCol="0" anchor="ctr"/>
+          <a:lstStyle/>
+          <a:p>
+            <a:pPr algn="ctr"/>
+            <a:endParaRPr lang="en-US"/>
+          </a:p>
+        </p:txBody>
+      </p:sp>
+      <p:cxnSp>
+        <p:nvCxnSpPr>
+          <p:cNvPr id="46" name="Straight Connector 45">
+            <a:extLst>
+              <a:ext uri="{FF2B5EF4-FFF2-40B4-BE49-F238E27FC236}">
+                <a16:creationId xmlns:a16="http://schemas.microsoft.com/office/drawing/2014/main" id="{87D842AC-5B19-CE45-A2A5-98629065C0FB}"/>
+              </a:ext>
+            </a:extLst>
+          </p:cNvPr>
+          <p:cNvCxnSpPr>
+            <a:cxnSpLocks/>
+          </p:cNvCxnSpPr>
+          <p:nvPr/>
+        </p:nvCxnSpPr>
+        <p:spPr>
+          <a:xfrm>
+            <a:off x="2066085" y="2189549"/>
+            <a:ext cx="162046" cy="0"/>
+          </a:xfrm>
+          <a:prstGeom prst="line">
+            <a:avLst/>
+          </a:prstGeom>
+          <a:ln w="19050">
+            <a:solidFill>
+              <a:schemeClr val="accent1">
+                <a:lumMod val="50000"/>
+              </a:schemeClr>
+            </a:solidFill>
+          </a:ln>
+        </p:spPr>
+        <p:style>
+          <a:lnRef idx="1">
+            <a:schemeClr val="accent1"/>
+          </a:lnRef>
+          <a:fillRef idx="0">
+            <a:schemeClr val="accent1"/>
+          </a:fillRef>
+          <a:effectRef idx="0">
+            <a:schemeClr val="accent1"/>
+          </a:effectRef>
+          <a:fontRef idx="minor">
+            <a:schemeClr val="tx1"/>
+          </a:fontRef>
+        </p:style>
+      </p:cxnSp>
+      <p:sp>
+        <p:nvSpPr>
+          <p:cNvPr id="47" name="Oval 46">
+            <a:extLst>
+              <a:ext uri="{FF2B5EF4-FFF2-40B4-BE49-F238E27FC236}">
+                <a16:creationId xmlns:a16="http://schemas.microsoft.com/office/drawing/2014/main" id="{D70EE779-1FC3-F84B-A7A7-7FCC6EF26DE2}"/>
+              </a:ext>
+            </a:extLst>
+          </p:cNvPr>
+          <p:cNvSpPr/>
+          <p:nvPr/>
+        </p:nvSpPr>
+        <p:spPr>
+          <a:xfrm>
+            <a:off x="2167996" y="2284382"/>
+            <a:ext cx="108354" cy="108354"/>
+          </a:xfrm>
+          <a:prstGeom prst="ellipse">
+            <a:avLst/>
+          </a:prstGeom>
+          <a:ln>
+            <a:solidFill>
+              <a:schemeClr val="accent1">
+                <a:lumMod val="50000"/>
+              </a:schemeClr>
+            </a:solidFill>
+          </a:ln>
+        </p:spPr>
+        <p:style>
+          <a:lnRef idx="2">
+            <a:schemeClr val="accent1">
+              <a:shade val="50000"/>
+            </a:schemeClr>
+          </a:lnRef>
+          <a:fillRef idx="1">
+            <a:schemeClr val="accent1"/>
+          </a:fillRef>
+          <a:effectRef idx="0">
+            <a:schemeClr val="accent1"/>
+          </a:effectRef>
+          <a:fontRef idx="minor">
+            <a:schemeClr val="lt1"/>
+          </a:fontRef>
+        </p:style>
+        <p:txBody>
+          <a:bodyPr rtlCol="0" anchor="ctr"/>
+          <a:lstStyle/>
+          <a:p>
+            <a:pPr algn="ctr"/>
+            <a:endParaRPr lang="en-US"/>
+          </a:p>
+        </p:txBody>
+      </p:sp>
+      <p:cxnSp>
+        <p:nvCxnSpPr>
+          <p:cNvPr id="48" name="Straight Connector 47">
+            <a:extLst>
+              <a:ext uri="{FF2B5EF4-FFF2-40B4-BE49-F238E27FC236}">
+                <a16:creationId xmlns:a16="http://schemas.microsoft.com/office/drawing/2014/main" id="{89FE71C8-98C9-0D46-AFEE-489D1CAE4309}"/>
+              </a:ext>
+            </a:extLst>
+          </p:cNvPr>
+          <p:cNvCxnSpPr>
+            <a:cxnSpLocks/>
+          </p:cNvCxnSpPr>
+          <p:nvPr/>
+        </p:nvCxnSpPr>
+        <p:spPr>
+          <a:xfrm>
+            <a:off x="2010144" y="2341949"/>
+            <a:ext cx="162046" cy="0"/>
+          </a:xfrm>
+          <a:prstGeom prst="line">
+            <a:avLst/>
+          </a:prstGeom>
+          <a:ln w="19050">
+            <a:solidFill>
+              <a:schemeClr val="accent1">
+                <a:lumMod val="50000"/>
+              </a:schemeClr>
+            </a:solidFill>
+          </a:ln>
+        </p:spPr>
+        <p:style>
+          <a:lnRef idx="1">
+            <a:schemeClr val="accent1"/>
+          </a:lnRef>
+          <a:fillRef idx="0">
+            <a:schemeClr val="accent1"/>
+          </a:fillRef>
+          <a:effectRef idx="0">
+            <a:schemeClr val="accent1"/>
+          </a:effectRef>
+          <a:fontRef idx="minor">
+            <a:schemeClr val="tx1"/>
+          </a:fontRef>
+        </p:style>
+      </p:cxnSp>
+      <p:sp>
+        <p:nvSpPr>
+          <p:cNvPr id="49" name="Oval 48">
+            <a:extLst>
+              <a:ext uri="{FF2B5EF4-FFF2-40B4-BE49-F238E27FC236}">
+                <a16:creationId xmlns:a16="http://schemas.microsoft.com/office/drawing/2014/main" id="{6B04F19F-0CE4-6743-9597-AF1AB6043E2A}"/>
+              </a:ext>
+            </a:extLst>
+          </p:cNvPr>
+          <p:cNvSpPr/>
+          <p:nvPr/>
+        </p:nvSpPr>
+        <p:spPr>
+          <a:xfrm>
+            <a:off x="2374411" y="2436782"/>
+            <a:ext cx="108354" cy="108354"/>
+          </a:xfrm>
+          <a:prstGeom prst="ellipse">
+            <a:avLst/>
+          </a:prstGeom>
+          <a:ln>
+            <a:solidFill>
+              <a:schemeClr val="accent1">
+                <a:lumMod val="50000"/>
+              </a:schemeClr>
+            </a:solidFill>
+          </a:ln>
+        </p:spPr>
+        <p:style>
+          <a:lnRef idx="2">
+            <a:schemeClr val="accent1">
+              <a:shade val="50000"/>
+            </a:schemeClr>
+          </a:lnRef>
+          <a:fillRef idx="1">
+            <a:schemeClr val="accent1"/>
+          </a:fillRef>
+          <a:effectRef idx="0">
+            <a:schemeClr val="accent1"/>
+          </a:effectRef>
+          <a:fontRef idx="minor">
+            <a:schemeClr val="lt1"/>
+          </a:fontRef>
+        </p:style>
+        <p:txBody>
+          <a:bodyPr rtlCol="0" anchor="ctr"/>
+          <a:lstStyle/>
+          <a:p>
+            <a:pPr algn="ctr"/>
+            <a:endParaRPr lang="en-US"/>
+          </a:p>
+        </p:txBody>
+      </p:sp>
+      <p:cxnSp>
+        <p:nvCxnSpPr>
+          <p:cNvPr id="50" name="Straight Connector 49">
+            <a:extLst>
+              <a:ext uri="{FF2B5EF4-FFF2-40B4-BE49-F238E27FC236}">
+                <a16:creationId xmlns:a16="http://schemas.microsoft.com/office/drawing/2014/main" id="{2E03D552-0116-E742-AC97-C1CD93A6C3F0}"/>
+              </a:ext>
+            </a:extLst>
+          </p:cNvPr>
+          <p:cNvCxnSpPr>
+            <a:cxnSpLocks/>
+          </p:cNvCxnSpPr>
+          <p:nvPr/>
+        </p:nvCxnSpPr>
+        <p:spPr>
+          <a:xfrm>
+            <a:off x="2216559" y="2494349"/>
+            <a:ext cx="162046" cy="0"/>
+          </a:xfrm>
+          <a:prstGeom prst="line">
+            <a:avLst/>
+          </a:prstGeom>
+          <a:ln w="19050">
+            <a:solidFill>
+              <a:schemeClr val="accent1">
+                <a:lumMod val="50000"/>
+              </a:schemeClr>
+            </a:solidFill>
+          </a:ln>
+        </p:spPr>
+        <p:style>
+          <a:lnRef idx="1">
+            <a:schemeClr val="accent1"/>
+          </a:lnRef>
+          <a:fillRef idx="0">
+            <a:schemeClr val="accent1"/>
+          </a:fillRef>
+          <a:effectRef idx="0">
+            <a:schemeClr val="accent1"/>
+          </a:effectRef>
+          <a:fontRef idx="minor">
+            <a:schemeClr val="tx1"/>
+          </a:fontRef>
+        </p:style>
+      </p:cxnSp>
+      <p:sp>
+        <p:nvSpPr>
+          <p:cNvPr id="51" name="Oval 50">
+            <a:extLst>
+              <a:ext uri="{FF2B5EF4-FFF2-40B4-BE49-F238E27FC236}">
+                <a16:creationId xmlns:a16="http://schemas.microsoft.com/office/drawing/2014/main" id="{359D2E9D-2CB4-1244-88D7-881FF9FFCDE9}"/>
+              </a:ext>
+            </a:extLst>
+          </p:cNvPr>
+          <p:cNvSpPr/>
+          <p:nvPr/>
+        </p:nvSpPr>
+        <p:spPr>
+          <a:xfrm>
+            <a:off x="2372485" y="2589182"/>
+            <a:ext cx="108354" cy="108354"/>
+          </a:xfrm>
+          <a:prstGeom prst="ellipse">
+            <a:avLst/>
+          </a:prstGeom>
+          <a:ln>
+            <a:solidFill>
+              <a:schemeClr val="accent1">
+                <a:lumMod val="50000"/>
+              </a:schemeClr>
+            </a:solidFill>
+          </a:ln>
+        </p:spPr>
+        <p:style>
+          <a:lnRef idx="2">
+            <a:schemeClr val="accent1">
+              <a:shade val="50000"/>
+            </a:schemeClr>
+          </a:lnRef>
+          <a:fillRef idx="1">
+            <a:schemeClr val="accent1"/>
+          </a:fillRef>
+          <a:effectRef idx="0">
+            <a:schemeClr val="accent1"/>
+          </a:effectRef>
+          <a:fontRef idx="minor">
+            <a:schemeClr val="lt1"/>
+          </a:fontRef>
+        </p:style>
+        <p:txBody>
+          <a:bodyPr rtlCol="0" anchor="ctr"/>
+          <a:lstStyle/>
+          <a:p>
+            <a:pPr algn="ctr"/>
+            <a:endParaRPr lang="en-US"/>
+          </a:p>
+        </p:txBody>
+      </p:sp>
+      <p:cxnSp>
+        <p:nvCxnSpPr>
+          <p:cNvPr id="52" name="Straight Connector 51">
+            <a:extLst>
+              <a:ext uri="{FF2B5EF4-FFF2-40B4-BE49-F238E27FC236}">
+                <a16:creationId xmlns:a16="http://schemas.microsoft.com/office/drawing/2014/main" id="{C656BD95-32D5-3B43-B0E8-8A49C9252CC8}"/>
+              </a:ext>
+            </a:extLst>
+          </p:cNvPr>
+          <p:cNvCxnSpPr>
+            <a:cxnSpLocks/>
+          </p:cNvCxnSpPr>
+          <p:nvPr/>
+        </p:nvCxnSpPr>
+        <p:spPr>
+          <a:xfrm>
+            <a:off x="2214633" y="2646749"/>
+            <a:ext cx="162046" cy="0"/>
+          </a:xfrm>
+          <a:prstGeom prst="line">
+            <a:avLst/>
+          </a:prstGeom>
+          <a:ln w="19050">
+            <a:solidFill>
+              <a:schemeClr val="accent1">
+                <a:lumMod val="50000"/>
+              </a:schemeClr>
+            </a:solidFill>
+          </a:ln>
+        </p:spPr>
+        <p:style>
+          <a:lnRef idx="1">
+            <a:schemeClr val="accent1"/>
+          </a:lnRef>
+          <a:fillRef idx="0">
+            <a:schemeClr val="accent1"/>
+          </a:fillRef>
+          <a:effectRef idx="0">
+            <a:schemeClr val="accent1"/>
+          </a:effectRef>
+          <a:fontRef idx="minor">
+            <a:schemeClr val="tx1"/>
+          </a:fontRef>
+        </p:style>
+      </p:cxnSp>
+      <p:sp>
+        <p:nvSpPr>
+          <p:cNvPr id="53" name="Oval 52">
+            <a:extLst>
+              <a:ext uri="{FF2B5EF4-FFF2-40B4-BE49-F238E27FC236}">
+                <a16:creationId xmlns:a16="http://schemas.microsoft.com/office/drawing/2014/main" id="{8AD2799D-81E2-C141-90B3-C5CDE1C8325A}"/>
+              </a:ext>
+            </a:extLst>
+          </p:cNvPr>
+          <p:cNvSpPr/>
+          <p:nvPr/>
+        </p:nvSpPr>
+        <p:spPr>
+          <a:xfrm>
+            <a:off x="2169927" y="2737722"/>
+            <a:ext cx="108354" cy="108354"/>
+          </a:xfrm>
+          <a:prstGeom prst="ellipse">
+            <a:avLst/>
+          </a:prstGeom>
+          <a:ln>
+            <a:solidFill>
+              <a:schemeClr val="accent1">
+                <a:lumMod val="50000"/>
+              </a:schemeClr>
+            </a:solidFill>
+          </a:ln>
+        </p:spPr>
+        <p:style>
+          <a:lnRef idx="2">
+            <a:schemeClr val="accent1">
+              <a:shade val="50000"/>
+            </a:schemeClr>
+          </a:lnRef>
+          <a:fillRef idx="1">
+            <a:schemeClr val="accent1"/>
+          </a:fillRef>
+          <a:effectRef idx="0">
+            <a:schemeClr val="accent1"/>
+          </a:effectRef>
+          <a:fontRef idx="minor">
+            <a:schemeClr val="lt1"/>
+          </a:fontRef>
+        </p:style>
+        <p:txBody>
+          <a:bodyPr rtlCol="0" anchor="ctr"/>
+          <a:lstStyle/>
+          <a:p>
+            <a:pPr algn="ctr"/>
+            <a:endParaRPr lang="en-US"/>
+          </a:p>
+        </p:txBody>
+      </p:sp>
+      <p:cxnSp>
+        <p:nvCxnSpPr>
+          <p:cNvPr id="54" name="Straight Connector 53">
+            <a:extLst>
+              <a:ext uri="{FF2B5EF4-FFF2-40B4-BE49-F238E27FC236}">
+                <a16:creationId xmlns:a16="http://schemas.microsoft.com/office/drawing/2014/main" id="{29F1FBF9-A9DF-4C44-BA02-63F6A8757CC5}"/>
+              </a:ext>
+            </a:extLst>
+          </p:cNvPr>
+          <p:cNvCxnSpPr>
+            <a:cxnSpLocks/>
+          </p:cNvCxnSpPr>
+          <p:nvPr/>
+        </p:nvCxnSpPr>
+        <p:spPr>
+          <a:xfrm>
+            <a:off x="2012075" y="2795289"/>
+            <a:ext cx="162046" cy="0"/>
+          </a:xfrm>
+          <a:prstGeom prst="line">
+            <a:avLst/>
+          </a:prstGeom>
+          <a:ln w="19050">
+            <a:solidFill>
+              <a:schemeClr val="accent1">
+                <a:lumMod val="50000"/>
+              </a:schemeClr>
+            </a:solidFill>
+          </a:ln>
+        </p:spPr>
+        <p:style>
+          <a:lnRef idx="1">
+            <a:schemeClr val="accent1"/>
+          </a:lnRef>
+          <a:fillRef idx="0">
+            <a:schemeClr val="accent1"/>
+          </a:fillRef>
+          <a:effectRef idx="0">
+            <a:schemeClr val="accent1"/>
+          </a:effectRef>
+          <a:fontRef idx="minor">
+            <a:schemeClr val="tx1"/>
+          </a:fontRef>
+        </p:style>
+      </p:cxnSp>
+      <p:sp>
+        <p:nvSpPr>
+          <p:cNvPr id="55" name="Oval 54">
+            <a:extLst>
+              <a:ext uri="{FF2B5EF4-FFF2-40B4-BE49-F238E27FC236}">
+                <a16:creationId xmlns:a16="http://schemas.microsoft.com/office/drawing/2014/main" id="{3C7DCEB4-E5D5-DE4F-947D-A0D63A9E195D}"/>
+              </a:ext>
+            </a:extLst>
+          </p:cNvPr>
+          <p:cNvSpPr/>
+          <p:nvPr/>
+        </p:nvSpPr>
+        <p:spPr>
+          <a:xfrm>
+            <a:off x="1951940" y="2897840"/>
+            <a:ext cx="108354" cy="108354"/>
+          </a:xfrm>
+          <a:prstGeom prst="ellipse">
+            <a:avLst/>
+          </a:prstGeom>
+          <a:ln>
+            <a:solidFill>
+              <a:schemeClr val="accent1">
+                <a:lumMod val="50000"/>
+              </a:schemeClr>
+            </a:solidFill>
+          </a:ln>
+        </p:spPr>
+        <p:style>
+          <a:lnRef idx="2">
+            <a:schemeClr val="accent1">
+              <a:shade val="50000"/>
+            </a:schemeClr>
+          </a:lnRef>
+          <a:fillRef idx="1">
+            <a:schemeClr val="accent1"/>
+          </a:fillRef>
+          <a:effectRef idx="0">
+            <a:schemeClr val="accent1"/>
+          </a:effectRef>
+          <a:fontRef idx="minor">
+            <a:schemeClr val="lt1"/>
+          </a:fontRef>
+        </p:style>
+        <p:txBody>
+          <a:bodyPr rtlCol="0" anchor="ctr"/>
+          <a:lstStyle/>
+          <a:p>
+            <a:pPr algn="ctr"/>
+            <a:endParaRPr lang="en-US"/>
+          </a:p>
+        </p:txBody>
+      </p:sp>
+      <p:cxnSp>
+        <p:nvCxnSpPr>
+          <p:cNvPr id="56" name="Straight Connector 55">
+            <a:extLst>
+              <a:ext uri="{FF2B5EF4-FFF2-40B4-BE49-F238E27FC236}">
+                <a16:creationId xmlns:a16="http://schemas.microsoft.com/office/drawing/2014/main" id="{DACA20B8-E033-F641-8E65-B88FB80B9041}"/>
+              </a:ext>
+            </a:extLst>
+          </p:cNvPr>
+          <p:cNvCxnSpPr>
+            <a:cxnSpLocks/>
+          </p:cNvCxnSpPr>
+          <p:nvPr/>
+        </p:nvCxnSpPr>
+        <p:spPr>
+          <a:xfrm>
+            <a:off x="2064159" y="2955407"/>
+            <a:ext cx="162046" cy="0"/>
+          </a:xfrm>
+          <a:prstGeom prst="line">
+            <a:avLst/>
+          </a:prstGeom>
+          <a:ln w="19050">
+            <a:solidFill>
+              <a:schemeClr val="accent1">
+                <a:lumMod val="50000"/>
+              </a:schemeClr>
+            </a:solidFill>
+          </a:ln>
+        </p:spPr>
+        <p:style>
+          <a:lnRef idx="1">
+            <a:schemeClr val="accent1"/>
+          </a:lnRef>
+          <a:fillRef idx="0">
+            <a:schemeClr val="accent1"/>
+          </a:fillRef>
+          <a:effectRef idx="0">
+            <a:schemeClr val="accent1"/>
+          </a:effectRef>
+          <a:fontRef idx="minor">
+            <a:schemeClr val="tx1"/>
+          </a:fontRef>
+        </p:style>
+      </p:cxnSp>
+      <p:sp>
+        <p:nvSpPr>
+          <p:cNvPr id="57" name="Rectangle 56">
+            <a:extLst>
+              <a:ext uri="{FF2B5EF4-FFF2-40B4-BE49-F238E27FC236}">
+                <a16:creationId xmlns:a16="http://schemas.microsoft.com/office/drawing/2014/main" id="{2F72152E-9807-A24A-A4AF-D79D4B580E4A}"/>
+              </a:ext>
+            </a:extLst>
+          </p:cNvPr>
+          <p:cNvSpPr/>
+          <p:nvPr/>
+        </p:nvSpPr>
+        <p:spPr>
+          <a:xfrm>
+            <a:off x="3098328" y="2461384"/>
+            <a:ext cx="1907425" cy="735879"/>
+          </a:xfrm>
+          <a:prstGeom prst="rect">
+            <a:avLst/>
+          </a:prstGeom>
+          <a:solidFill>
+            <a:schemeClr val="accent5">
+              <a:lumMod val="40000"/>
+              <a:lumOff val="60000"/>
+            </a:schemeClr>
+          </a:solidFill>
+        </p:spPr>
+        <p:style>
+          <a:lnRef idx="2">
+            <a:schemeClr val="accent1">
+              <a:shade val="50000"/>
+            </a:schemeClr>
+          </a:lnRef>
+          <a:fillRef idx="1">
+            <a:schemeClr val="accent1"/>
+          </a:fillRef>
+          <a:effectRef idx="0">
+            <a:schemeClr val="accent1"/>
+          </a:effectRef>
+          <a:fontRef idx="minor">
+            <a:schemeClr val="lt1"/>
+          </a:fontRef>
+        </p:style>
+        <p:txBody>
+          <a:bodyPr rtlCol="0" anchor="ctr"/>
+          <a:lstStyle/>
+          <a:p>
+            <a:pPr algn="ctr"/>
+            <a:endParaRPr lang="en-US"/>
+          </a:p>
+        </p:txBody>
+      </p:sp>
+      <p:sp>
+        <p:nvSpPr>
+          <p:cNvPr id="58" name="Line Callout 1 57">
+            <a:extLst>
+              <a:ext uri="{FF2B5EF4-FFF2-40B4-BE49-F238E27FC236}">
+                <a16:creationId xmlns:a16="http://schemas.microsoft.com/office/drawing/2014/main" id="{F8BDE546-3DA3-9D44-AD0A-D8DEBC8B98A6}"/>
+              </a:ext>
+            </a:extLst>
+          </p:cNvPr>
+          <p:cNvSpPr/>
+          <p:nvPr/>
+        </p:nvSpPr>
+        <p:spPr>
+          <a:xfrm>
+            <a:off x="5608640" y="2327842"/>
+            <a:ext cx="1282320" cy="693575"/>
+          </a:xfrm>
+          <a:prstGeom prst="borderCallout1">
+            <a:avLst>
+              <a:gd name="adj1" fmla="val 60367"/>
+              <a:gd name="adj2" fmla="val -12795"/>
+              <a:gd name="adj3" fmla="val 72064"/>
+              <a:gd name="adj4" fmla="val -65867"/>
+            </a:avLst>
+          </a:prstGeom>
+          <a:solidFill>
+            <a:schemeClr val="tx1"/>
+          </a:solidFill>
+          <a:ln w="38100">
+            <a:solidFill>
+              <a:schemeClr val="tx1"/>
+            </a:solidFill>
+          </a:ln>
+        </p:spPr>
+        <p:style>
+          <a:lnRef idx="2">
+            <a:schemeClr val="accent1">
+              <a:shade val="50000"/>
+            </a:schemeClr>
+          </a:lnRef>
+          <a:fillRef idx="1">
+            <a:schemeClr val="accent1"/>
+          </a:fillRef>
+          <a:effectRef idx="0">
+            <a:schemeClr val="accent1"/>
+          </a:effectRef>
+          <a:fontRef idx="minor">
+            <a:schemeClr val="lt1"/>
+          </a:fontRef>
+        </p:style>
+        <p:txBody>
+          <a:bodyPr rtlCol="0" anchor="ctr"/>
+          <a:lstStyle/>
+          <a:p>
+            <a:pPr algn="ctr"/>
+            <a:r>
+              <a:rPr lang="en-US" sz="1200" dirty="0"/>
+              <a:t>Modal dialog to get link, JavaScript, etc. </a:t>
+            </a:r>
+          </a:p>
+        </p:txBody>
+      </p:sp>
+      <p:sp>
+        <p:nvSpPr>
+          <p:cNvPr id="59" name="Line Callout 1 58">
+            <a:extLst>
+              <a:ext uri="{FF2B5EF4-FFF2-40B4-BE49-F238E27FC236}">
+                <a16:creationId xmlns:a16="http://schemas.microsoft.com/office/drawing/2014/main" id="{DD87AC3A-B178-E743-BD54-26184F482C78}"/>
+              </a:ext>
+            </a:extLst>
+          </p:cNvPr>
+          <p:cNvSpPr/>
+          <p:nvPr/>
+        </p:nvSpPr>
+        <p:spPr>
+          <a:xfrm>
+            <a:off x="384879" y="2969657"/>
+            <a:ext cx="1086848" cy="489901"/>
+          </a:xfrm>
+          <a:prstGeom prst="borderCallout1">
+            <a:avLst>
+              <a:gd name="adj1" fmla="val 53188"/>
+              <a:gd name="adj2" fmla="val 106933"/>
+              <a:gd name="adj3" fmla="val 16846"/>
+              <a:gd name="adj4" fmla="val 156331"/>
+            </a:avLst>
+          </a:prstGeom>
+          <a:solidFill>
+            <a:schemeClr val="tx1"/>
+          </a:solidFill>
+          <a:ln w="38100">
+            <a:solidFill>
+              <a:schemeClr val="tx1"/>
+            </a:solidFill>
+          </a:ln>
+        </p:spPr>
+        <p:style>
+          <a:lnRef idx="2">
+            <a:schemeClr val="accent1">
+              <a:shade val="50000"/>
+            </a:schemeClr>
+          </a:lnRef>
+          <a:fillRef idx="1">
+            <a:schemeClr val="accent1"/>
+          </a:fillRef>
+          <a:effectRef idx="0">
+            <a:schemeClr val="accent1"/>
+          </a:effectRef>
+          <a:fontRef idx="minor">
+            <a:schemeClr val="lt1"/>
+          </a:fontRef>
+        </p:style>
+        <p:txBody>
+          <a:bodyPr rtlCol="0" anchor="ctr"/>
+          <a:lstStyle/>
+          <a:p>
+            <a:pPr algn="ctr"/>
+            <a:r>
+              <a:rPr lang="en-US" sz="1200" dirty="0"/>
+              <a:t>Drag and drop content tree </a:t>
+            </a:r>
+          </a:p>
+        </p:txBody>
+      </p:sp>
+      <p:sp>
+        <p:nvSpPr>
+          <p:cNvPr id="60" name="Line Callout 1 59">
+            <a:extLst>
+              <a:ext uri="{FF2B5EF4-FFF2-40B4-BE49-F238E27FC236}">
+                <a16:creationId xmlns:a16="http://schemas.microsoft.com/office/drawing/2014/main" id="{1717F8F3-3336-9146-8B39-6487695281A3}"/>
+              </a:ext>
+            </a:extLst>
+          </p:cNvPr>
+          <p:cNvSpPr/>
+          <p:nvPr/>
+        </p:nvSpPr>
+        <p:spPr>
+          <a:xfrm>
+            <a:off x="10218200" y="367991"/>
+            <a:ext cx="1195533" cy="648295"/>
+          </a:xfrm>
+          <a:prstGeom prst="borderCallout1">
+            <a:avLst>
+              <a:gd name="adj1" fmla="val 60367"/>
+              <a:gd name="adj2" fmla="val -12795"/>
+              <a:gd name="adj3" fmla="val 187264"/>
+              <a:gd name="adj4" fmla="val -46419"/>
+            </a:avLst>
+          </a:prstGeom>
+          <a:solidFill>
+            <a:schemeClr val="tx1"/>
+          </a:solidFill>
+          <a:ln w="38100">
+            <a:solidFill>
+              <a:schemeClr val="tx1"/>
+            </a:solidFill>
+          </a:ln>
+        </p:spPr>
+        <p:style>
+          <a:lnRef idx="2">
+            <a:schemeClr val="accent1">
+              <a:shade val="50000"/>
+            </a:schemeClr>
+          </a:lnRef>
+          <a:fillRef idx="1">
+            <a:schemeClr val="accent1"/>
+          </a:fillRef>
+          <a:effectRef idx="0">
+            <a:schemeClr val="accent1"/>
+          </a:effectRef>
+          <a:fontRef idx="minor">
+            <a:schemeClr val="lt1"/>
+          </a:fontRef>
+        </p:style>
+        <p:txBody>
+          <a:bodyPr rtlCol="0" anchor="ctr"/>
+          <a:lstStyle/>
+          <a:p>
+            <a:pPr algn="ctr"/>
+            <a:r>
+              <a:rPr lang="en-US" sz="1200" dirty="0"/>
+              <a:t>Writing area tool and address bars</a:t>
+            </a:r>
+          </a:p>
+        </p:txBody>
+      </p:sp>
+      <p:sp>
+        <p:nvSpPr>
+          <p:cNvPr id="61" name="Rectangle 60">
+            <a:extLst>
+              <a:ext uri="{FF2B5EF4-FFF2-40B4-BE49-F238E27FC236}">
+                <a16:creationId xmlns:a16="http://schemas.microsoft.com/office/drawing/2014/main" id="{540D52D5-9A9A-A74A-A661-ACF553D26A5B}"/>
+              </a:ext>
+            </a:extLst>
+          </p:cNvPr>
+          <p:cNvSpPr/>
+          <p:nvPr/>
+        </p:nvSpPr>
+        <p:spPr>
+          <a:xfrm>
+            <a:off x="3178095" y="2571087"/>
+            <a:ext cx="949550" cy="122031"/>
+          </a:xfrm>
+          <a:prstGeom prst="rect">
+            <a:avLst/>
+          </a:prstGeom>
+          <a:solidFill>
+            <a:schemeClr val="accent4">
+              <a:lumMod val="20000"/>
+              <a:lumOff val="80000"/>
+            </a:schemeClr>
+          </a:solidFill>
+        </p:spPr>
+        <p:style>
+          <a:lnRef idx="2">
+            <a:schemeClr val="accent1">
+              <a:shade val="50000"/>
+            </a:schemeClr>
+          </a:lnRef>
+          <a:fillRef idx="1">
+            <a:schemeClr val="accent1"/>
+          </a:fillRef>
+          <a:effectRef idx="0">
+            <a:schemeClr val="accent1"/>
+          </a:effectRef>
+          <a:fontRef idx="minor">
+            <a:schemeClr val="lt1"/>
+          </a:fontRef>
+        </p:style>
+        <p:txBody>
+          <a:bodyPr rtlCol="0" anchor="ctr"/>
+          <a:lstStyle/>
+          <a:p>
+            <a:pPr algn="ctr"/>
+            <a:endParaRPr lang="en-US"/>
+          </a:p>
+        </p:txBody>
+      </p:sp>
+    </p:spTree>
+    <p:extLst>
+      <p:ext uri="{BB962C8B-B14F-4D97-AF65-F5344CB8AC3E}">
+        <p14:creationId xmlns:p14="http://schemas.microsoft.com/office/powerpoint/2010/main" val="2900343637"/>
+      </p:ext>
+    </p:extLst>
+  </p:cSld>
+  <p:clrMapOvr>
+    <a:masterClrMapping/>
+  </p:clrMapOvr>
+</p:sld>
+</file>
+
+<file path=ppt/slides/slide6.xml><?xml version="1.0" encoding="utf-8"?>
+<p:sld xmlns:a="http://schemas.openxmlformats.org/drawingml/2006/main" xmlns:r="http://schemas.openxmlformats.org/officeDocument/2006/relationships" xmlns:p="http://schemas.openxmlformats.org/presentationml/2006/main">
+  <p:cSld>
+    <p:spTree>
+      <p:nvGrpSpPr>
+        <p:cNvPr id="1" name=""/>
+        <p:cNvGrpSpPr/>
+        <p:nvPr/>
+      </p:nvGrpSpPr>
+      <p:grpSpPr>
+        <a:xfrm>
+          <a:off x="0" y="0"/>
+          <a:ext cx="0" cy="0"/>
+          <a:chOff x="0" y="0"/>
+          <a:chExt cx="0" cy="0"/>
+        </a:xfrm>
+      </p:grpSpPr>
+      <p:sp>
+        <p:nvSpPr>
+          <p:cNvPr id="29" name="Rectangle 28">
+            <a:extLst>
+              <a:ext uri="{FF2B5EF4-FFF2-40B4-BE49-F238E27FC236}">
+                <a16:creationId xmlns:a16="http://schemas.microsoft.com/office/drawing/2014/main" id="{A3B64C9E-0E58-7B4F-B915-7C462DA0CD3E}"/>
+              </a:ext>
+            </a:extLst>
+          </p:cNvPr>
+          <p:cNvSpPr/>
+          <p:nvPr/>
+        </p:nvSpPr>
+        <p:spPr>
+          <a:xfrm>
+            <a:off x="7444459" y="1113895"/>
+            <a:ext cx="3600449" cy="4501055"/>
+          </a:xfrm>
+          <a:prstGeom prst="rect">
+            <a:avLst/>
+          </a:prstGeom>
+        </p:spPr>
+        <p:style>
+          <a:lnRef idx="2">
+            <a:schemeClr val="accent1">
+              <a:shade val="50000"/>
+            </a:schemeClr>
+          </a:lnRef>
+          <a:fillRef idx="1">
+            <a:schemeClr val="accent1"/>
+          </a:fillRef>
+          <a:effectRef idx="0">
+            <a:schemeClr val="accent1"/>
+          </a:effectRef>
+          <a:fontRef idx="minor">
+            <a:schemeClr val="lt1"/>
+          </a:fontRef>
+        </p:style>
+        <p:txBody>
+          <a:bodyPr rtlCol="0" anchor="ctr"/>
+          <a:lstStyle/>
+          <a:p>
+            <a:pPr algn="ctr"/>
+            <a:endParaRPr lang="en-US" dirty="0"/>
+          </a:p>
+        </p:txBody>
+      </p:sp>
+      <p:sp>
+        <p:nvSpPr>
+          <p:cNvPr id="31" name="Rectangle 30">
+            <a:extLst>
+              <a:ext uri="{FF2B5EF4-FFF2-40B4-BE49-F238E27FC236}">
+                <a16:creationId xmlns:a16="http://schemas.microsoft.com/office/drawing/2014/main" id="{138AAD4D-1F67-D244-89A2-060ABA94FF5D}"/>
+              </a:ext>
+            </a:extLst>
+          </p:cNvPr>
+          <p:cNvSpPr/>
+          <p:nvPr/>
+        </p:nvSpPr>
+        <p:spPr>
+          <a:xfrm>
+            <a:off x="7858423" y="1479536"/>
+            <a:ext cx="3095046" cy="3734552"/>
+          </a:xfrm>
+          <a:prstGeom prst="rect">
+            <a:avLst/>
+          </a:prstGeom>
+          <a:solidFill>
+            <a:srgbClr val="FFC000"/>
+          </a:solidFill>
+        </p:spPr>
+        <p:style>
+          <a:lnRef idx="2">
+            <a:schemeClr val="accent1">
+              <a:shade val="50000"/>
+            </a:schemeClr>
+          </a:lnRef>
+          <a:fillRef idx="1">
+            <a:schemeClr val="accent1"/>
+          </a:fillRef>
+          <a:effectRef idx="0">
+            <a:schemeClr val="accent1"/>
+          </a:effectRef>
+          <a:fontRef idx="minor">
+            <a:schemeClr val="lt1"/>
+          </a:fontRef>
+        </p:style>
+        <p:txBody>
+          <a:bodyPr rtlCol="0" anchor="ctr"/>
+          <a:lstStyle/>
+          <a:p>
+            <a:pPr algn="ctr"/>
+            <a:endParaRPr lang="en-US"/>
+          </a:p>
+        </p:txBody>
+      </p:sp>
+      <p:sp>
+        <p:nvSpPr>
+          <p:cNvPr id="32" name="Rectangle 31">
+            <a:extLst>
+              <a:ext uri="{FF2B5EF4-FFF2-40B4-BE49-F238E27FC236}">
+                <a16:creationId xmlns:a16="http://schemas.microsoft.com/office/drawing/2014/main" id="{0AD75A0A-DB27-0B40-A08B-4E02F3FA9D33}"/>
+              </a:ext>
+            </a:extLst>
+          </p:cNvPr>
+          <p:cNvSpPr/>
+          <p:nvPr/>
+        </p:nvSpPr>
+        <p:spPr>
+          <a:xfrm>
+            <a:off x="7546602" y="1458314"/>
+            <a:ext cx="209677" cy="3755773"/>
+          </a:xfrm>
+          <a:prstGeom prst="rect">
+            <a:avLst/>
+          </a:prstGeom>
+          <a:solidFill>
+            <a:srgbClr val="FFC000"/>
+          </a:solidFill>
+        </p:spPr>
+        <p:style>
+          <a:lnRef idx="2">
+            <a:schemeClr val="accent1">
+              <a:shade val="50000"/>
+            </a:schemeClr>
+          </a:lnRef>
+          <a:fillRef idx="1">
+            <a:schemeClr val="accent1"/>
+          </a:fillRef>
+          <a:effectRef idx="0">
+            <a:schemeClr val="accent1"/>
+          </a:effectRef>
+          <a:fontRef idx="minor">
+            <a:schemeClr val="lt1"/>
+          </a:fontRef>
+        </p:style>
+        <p:txBody>
+          <a:bodyPr rtlCol="0" anchor="ctr"/>
+          <a:lstStyle/>
+          <a:p>
+            <a:pPr algn="ctr"/>
+            <a:endParaRPr lang="en-US"/>
+          </a:p>
+        </p:txBody>
+      </p:sp>
+      <p:sp>
+        <p:nvSpPr>
+          <p:cNvPr id="33" name="Rectangle 32">
+            <a:extLst>
+              <a:ext uri="{FF2B5EF4-FFF2-40B4-BE49-F238E27FC236}">
+                <a16:creationId xmlns:a16="http://schemas.microsoft.com/office/drawing/2014/main" id="{3DD6B8B1-96F3-1540-88E3-157754844EDA}"/>
+              </a:ext>
+            </a:extLst>
+          </p:cNvPr>
+          <p:cNvSpPr/>
+          <p:nvPr/>
+        </p:nvSpPr>
+        <p:spPr>
+          <a:xfrm>
+            <a:off x="7553106" y="1156989"/>
+            <a:ext cx="3400362" cy="241525"/>
+          </a:xfrm>
+          <a:prstGeom prst="rect">
+            <a:avLst/>
+          </a:prstGeom>
+          <a:solidFill>
+            <a:srgbClr val="FFC000"/>
+          </a:solidFill>
+        </p:spPr>
+        <p:style>
+          <a:lnRef idx="2">
+            <a:schemeClr val="accent1">
+              <a:shade val="50000"/>
+            </a:schemeClr>
+          </a:lnRef>
+          <a:fillRef idx="1">
+            <a:schemeClr val="accent1"/>
+          </a:fillRef>
+          <a:effectRef idx="0">
+            <a:schemeClr val="accent1"/>
+          </a:effectRef>
+          <a:fontRef idx="minor">
+            <a:schemeClr val="lt1"/>
+          </a:fontRef>
+        </p:style>
+        <p:txBody>
+          <a:bodyPr rtlCol="0" anchor="ctr"/>
+          <a:lstStyle/>
+          <a:p>
+            <a:pPr algn="ctr"/>
+            <a:endParaRPr lang="en-US"/>
+          </a:p>
+        </p:txBody>
+      </p:sp>
+      <p:sp>
+        <p:nvSpPr>
+          <p:cNvPr id="35" name="Rectangle 34">
+            <a:extLst>
+              <a:ext uri="{FF2B5EF4-FFF2-40B4-BE49-F238E27FC236}">
+                <a16:creationId xmlns:a16="http://schemas.microsoft.com/office/drawing/2014/main" id="{2AD389EC-1144-034A-B912-2F9D3FF56433}"/>
+              </a:ext>
+            </a:extLst>
+          </p:cNvPr>
+          <p:cNvSpPr/>
+          <p:nvPr/>
+        </p:nvSpPr>
+        <p:spPr>
+          <a:xfrm>
+            <a:off x="7566608" y="5256360"/>
+            <a:ext cx="3400362" cy="302146"/>
+          </a:xfrm>
+          <a:prstGeom prst="rect">
+            <a:avLst/>
+          </a:prstGeom>
+          <a:solidFill>
+            <a:srgbClr val="FFC000"/>
+          </a:solidFill>
+        </p:spPr>
+        <p:style>
+          <a:lnRef idx="2">
+            <a:schemeClr val="accent1">
+              <a:shade val="50000"/>
+            </a:schemeClr>
+          </a:lnRef>
+          <a:fillRef idx="1">
+            <a:schemeClr val="accent1"/>
+          </a:fillRef>
+          <a:effectRef idx="0">
+            <a:schemeClr val="accent1"/>
+          </a:effectRef>
+          <a:fontRef idx="minor">
+            <a:schemeClr val="lt1"/>
+          </a:fontRef>
+        </p:style>
+        <p:txBody>
+          <a:bodyPr rtlCol="0" anchor="ctr"/>
+          <a:lstStyle/>
+          <a:p>
+            <a:pPr algn="ctr"/>
+            <a:endParaRPr lang="en-US"/>
+          </a:p>
+        </p:txBody>
+      </p:sp>
+      <p:sp>
+        <p:nvSpPr>
+          <p:cNvPr id="21" name="Rectangle 20">
+            <a:extLst>
+              <a:ext uri="{FF2B5EF4-FFF2-40B4-BE49-F238E27FC236}">
+                <a16:creationId xmlns:a16="http://schemas.microsoft.com/office/drawing/2014/main" id="{5113ECAA-9663-C24F-A79A-CA9E4C9E57FE}"/>
+              </a:ext>
+            </a:extLst>
+          </p:cNvPr>
+          <p:cNvSpPr/>
+          <p:nvPr/>
+        </p:nvSpPr>
+        <p:spPr>
+          <a:xfrm>
+            <a:off x="7846197" y="1493134"/>
+            <a:ext cx="3093119" cy="150778"/>
+          </a:xfrm>
+          <a:prstGeom prst="rect">
+            <a:avLst/>
+          </a:prstGeom>
+          <a:solidFill>
+            <a:srgbClr val="FF8F7D"/>
+          </a:solidFill>
+        </p:spPr>
+        <p:style>
+          <a:lnRef idx="2">
+            <a:schemeClr val="accent1">
+              <a:shade val="50000"/>
+            </a:schemeClr>
+          </a:lnRef>
+          <a:fillRef idx="1">
+            <a:schemeClr val="accent1"/>
+          </a:fillRef>
+          <a:effectRef idx="0">
+            <a:schemeClr val="accent1"/>
+          </a:effectRef>
+          <a:fontRef idx="minor">
+            <a:schemeClr val="lt1"/>
+          </a:fontRef>
+        </p:style>
+        <p:txBody>
+          <a:bodyPr rtlCol="0" anchor="ctr"/>
+          <a:lstStyle/>
+          <a:p>
+            <a:pPr algn="ctr"/>
+            <a:endParaRPr lang="en-US"/>
+          </a:p>
+        </p:txBody>
+      </p:sp>
+      <p:sp>
+        <p:nvSpPr>
+          <p:cNvPr id="25" name="Line Callout 1 24">
+            <a:extLst>
+              <a:ext uri="{FF2B5EF4-FFF2-40B4-BE49-F238E27FC236}">
+                <a16:creationId xmlns:a16="http://schemas.microsoft.com/office/drawing/2014/main" id="{73C00E9C-2069-6744-9D7E-A37C09EB0234}"/>
+              </a:ext>
+            </a:extLst>
+          </p:cNvPr>
+          <p:cNvSpPr/>
+          <p:nvPr/>
+        </p:nvSpPr>
+        <p:spPr>
+          <a:xfrm>
+            <a:off x="10218200" y="367991"/>
+            <a:ext cx="1195533" cy="648295"/>
+          </a:xfrm>
+          <a:prstGeom prst="borderCallout1">
+            <a:avLst>
+              <a:gd name="adj1" fmla="val 60367"/>
+              <a:gd name="adj2" fmla="val -12795"/>
+              <a:gd name="adj3" fmla="val 187264"/>
+              <a:gd name="adj4" fmla="val -46419"/>
+            </a:avLst>
+          </a:prstGeom>
+          <a:solidFill>
+            <a:schemeClr val="tx1"/>
+          </a:solidFill>
+          <a:ln w="38100">
+            <a:solidFill>
+              <a:schemeClr val="tx1"/>
+            </a:solidFill>
+          </a:ln>
+        </p:spPr>
+        <p:style>
+          <a:lnRef idx="2">
+            <a:schemeClr val="accent1">
+              <a:shade val="50000"/>
+            </a:schemeClr>
+          </a:lnRef>
+          <a:fillRef idx="1">
+            <a:schemeClr val="accent1"/>
+          </a:fillRef>
+          <a:effectRef idx="0">
+            <a:schemeClr val="accent1"/>
+          </a:effectRef>
+          <a:fontRef idx="minor">
+            <a:schemeClr val="lt1"/>
+          </a:fontRef>
+        </p:style>
+        <p:txBody>
+          <a:bodyPr rtlCol="0" anchor="ctr"/>
+          <a:lstStyle/>
+          <a:p>
+            <a:pPr algn="ctr"/>
+            <a:r>
+              <a:rPr lang="en-US" sz="1200" dirty="0"/>
+              <a:t>Writing area tool and address bars</a:t>
+            </a:r>
+          </a:p>
+        </p:txBody>
+      </p:sp>
+      <p:sp>
+        <p:nvSpPr>
+          <p:cNvPr id="36" name="Rectangle 35">
+            <a:extLst>
+              <a:ext uri="{FF2B5EF4-FFF2-40B4-BE49-F238E27FC236}">
+                <a16:creationId xmlns:a16="http://schemas.microsoft.com/office/drawing/2014/main" id="{ABE50C39-D2A7-314C-8EAA-182EB48AF90B}"/>
+              </a:ext>
+            </a:extLst>
+          </p:cNvPr>
+          <p:cNvSpPr/>
+          <p:nvPr/>
+        </p:nvSpPr>
+        <p:spPr>
+          <a:xfrm>
+            <a:off x="290707" y="451921"/>
+            <a:ext cx="7153752" cy="442049"/>
+          </a:xfrm>
+          <a:prstGeom prst="rect">
+            <a:avLst/>
+          </a:prstGeom>
+          <a:solidFill>
+            <a:srgbClr val="FF8F7D"/>
+          </a:solidFill>
+        </p:spPr>
+        <p:style>
+          <a:lnRef idx="2">
+            <a:schemeClr val="accent1">
+              <a:shade val="50000"/>
+            </a:schemeClr>
+          </a:lnRef>
+          <a:fillRef idx="1">
+            <a:schemeClr val="accent1"/>
+          </a:fillRef>
+          <a:effectRef idx="0">
+            <a:schemeClr val="accent1"/>
+          </a:effectRef>
+          <a:fontRef idx="minor">
+            <a:schemeClr val="lt1"/>
+          </a:fontRef>
+        </p:style>
+        <p:txBody>
+          <a:bodyPr rtlCol="0" anchor="ctr"/>
+          <a:lstStyle/>
+          <a:p>
+            <a:pPr algn="ctr"/>
+            <a:endParaRPr lang="en-US"/>
+          </a:p>
+        </p:txBody>
+      </p:sp>
+      <p:sp>
+        <p:nvSpPr>
+          <p:cNvPr id="39" name="Rectangle 38">
+            <a:extLst>
+              <a:ext uri="{FF2B5EF4-FFF2-40B4-BE49-F238E27FC236}">
+                <a16:creationId xmlns:a16="http://schemas.microsoft.com/office/drawing/2014/main" id="{0654EF2D-BF03-F643-83B4-A04CACA07848}"/>
+              </a:ext>
+            </a:extLst>
+          </p:cNvPr>
+          <p:cNvSpPr/>
+          <p:nvPr/>
+        </p:nvSpPr>
+        <p:spPr>
+          <a:xfrm>
+            <a:off x="7858422" y="5036325"/>
+            <a:ext cx="3080894" cy="190376"/>
+          </a:xfrm>
+          <a:prstGeom prst="rect">
+            <a:avLst/>
+          </a:prstGeom>
+          <a:solidFill>
+            <a:srgbClr val="FF8F7D"/>
+          </a:solidFill>
+        </p:spPr>
+        <p:style>
+          <a:lnRef idx="2">
+            <a:schemeClr val="accent1">
+              <a:shade val="50000"/>
+            </a:schemeClr>
+          </a:lnRef>
+          <a:fillRef idx="1">
+            <a:schemeClr val="accent1"/>
+          </a:fillRef>
+          <a:effectRef idx="0">
+            <a:schemeClr val="accent1"/>
+          </a:effectRef>
+          <a:fontRef idx="minor">
+            <a:schemeClr val="lt1"/>
+          </a:fontRef>
+        </p:style>
+        <p:txBody>
+          <a:bodyPr rtlCol="0" anchor="ctr"/>
+          <a:lstStyle/>
+          <a:p>
+            <a:pPr algn="ctr"/>
+            <a:endParaRPr lang="en-US"/>
+          </a:p>
+        </p:txBody>
+      </p:sp>
+      <p:sp>
+        <p:nvSpPr>
+          <p:cNvPr id="20" name="Rectangle 19">
+            <a:extLst>
+              <a:ext uri="{FF2B5EF4-FFF2-40B4-BE49-F238E27FC236}">
+                <a16:creationId xmlns:a16="http://schemas.microsoft.com/office/drawing/2014/main" id="{D6D768A8-5BD0-B949-847B-38A3092EDF71}"/>
+              </a:ext>
+            </a:extLst>
+          </p:cNvPr>
+          <p:cNvSpPr/>
+          <p:nvPr/>
+        </p:nvSpPr>
+        <p:spPr>
+          <a:xfrm>
+            <a:off x="7844270" y="1646545"/>
+            <a:ext cx="3095046" cy="3447767"/>
+          </a:xfrm>
+          <a:prstGeom prst="rect">
+            <a:avLst/>
+          </a:prstGeom>
+          <a:solidFill>
+            <a:schemeClr val="bg1">
+              <a:lumMod val="95000"/>
+            </a:schemeClr>
+          </a:solidFill>
+        </p:spPr>
+        <p:style>
+          <a:lnRef idx="2">
+            <a:schemeClr val="accent1">
+              <a:shade val="50000"/>
+            </a:schemeClr>
+          </a:lnRef>
+          <a:fillRef idx="1">
+            <a:schemeClr val="accent1"/>
+          </a:fillRef>
+          <a:effectRef idx="0">
+            <a:schemeClr val="accent1"/>
+          </a:effectRef>
+          <a:fontRef idx="minor">
+            <a:schemeClr val="lt1"/>
+          </a:fontRef>
+        </p:style>
+        <p:txBody>
+          <a:bodyPr rtlCol="0" anchor="ctr"/>
+          <a:lstStyle/>
+          <a:p>
+            <a:pPr algn="ctr"/>
+            <a:endParaRPr lang="en-US"/>
+          </a:p>
+        </p:txBody>
+      </p:sp>
+      <p:sp>
+        <p:nvSpPr>
+          <p:cNvPr id="30" name="Line Callout 1 29">
+            <a:extLst>
+              <a:ext uri="{FF2B5EF4-FFF2-40B4-BE49-F238E27FC236}">
+                <a16:creationId xmlns:a16="http://schemas.microsoft.com/office/drawing/2014/main" id="{497EF891-63A4-1E42-8D27-AD42FF10C3DC}"/>
+              </a:ext>
+            </a:extLst>
+          </p:cNvPr>
+          <p:cNvSpPr/>
+          <p:nvPr/>
+        </p:nvSpPr>
+        <p:spPr>
+          <a:xfrm>
+            <a:off x="10785601" y="2092836"/>
+            <a:ext cx="1086848" cy="241525"/>
           </a:xfrm>
           <a:prstGeom prst="borderCallout1">
             <a:avLst>
@@ -7973,980 +9691,34 @@
             <a:pPr algn="ctr"/>
             <a:r>
               <a:rPr lang="en-US" sz="1200" dirty="0"/>
-              <a:t>Writing area info bar</a:t>
-            </a:r>
-          </a:p>
-        </p:txBody>
-      </p:sp>
-      <p:sp>
-        <p:nvSpPr>
-          <p:cNvPr id="41" name="Rectangle 40">
-            <a:extLst>
-              <a:ext uri="{FF2B5EF4-FFF2-40B4-BE49-F238E27FC236}">
-                <a16:creationId xmlns:a16="http://schemas.microsoft.com/office/drawing/2014/main" id="{1CC1F401-371C-4243-BD18-C1181FD8DE81}"/>
-              </a:ext>
-            </a:extLst>
-          </p:cNvPr>
-          <p:cNvSpPr/>
-          <p:nvPr/>
-        </p:nvSpPr>
-        <p:spPr>
-          <a:xfrm>
-            <a:off x="1873074" y="1483483"/>
-            <a:ext cx="850392" cy="0"/>
-          </a:xfrm>
-          <a:prstGeom prst="rect">
-            <a:avLst/>
-          </a:prstGeom>
-          <a:solidFill>
-            <a:schemeClr val="accent5">
-              <a:lumMod val="40000"/>
-              <a:lumOff val="60000"/>
-            </a:schemeClr>
-          </a:solidFill>
-        </p:spPr>
-        <p:style>
-          <a:lnRef idx="2">
-            <a:schemeClr val="accent1">
-              <a:shade val="50000"/>
-            </a:schemeClr>
-          </a:lnRef>
-          <a:fillRef idx="1">
-            <a:schemeClr val="accent1"/>
-          </a:fillRef>
-          <a:effectRef idx="0">
-            <a:schemeClr val="accent1"/>
-          </a:effectRef>
-          <a:fontRef idx="minor">
-            <a:schemeClr val="lt1"/>
-          </a:fontRef>
-        </p:style>
-        <p:txBody>
-          <a:bodyPr rtlCol="0" anchor="ctr"/>
-          <a:lstStyle/>
-          <a:p>
-            <a:pPr algn="ctr"/>
-            <a:endParaRPr lang="en-US"/>
-          </a:p>
-        </p:txBody>
-      </p:sp>
-      <p:sp>
-        <p:nvSpPr>
-          <p:cNvPr id="42" name="Rectangle 41">
-            <a:extLst>
-              <a:ext uri="{FF2B5EF4-FFF2-40B4-BE49-F238E27FC236}">
-                <a16:creationId xmlns:a16="http://schemas.microsoft.com/office/drawing/2014/main" id="{41E76363-77A7-544B-8ED4-4543BA5BEA30}"/>
-              </a:ext>
-            </a:extLst>
-          </p:cNvPr>
-          <p:cNvSpPr/>
-          <p:nvPr/>
-        </p:nvSpPr>
-        <p:spPr>
-          <a:xfrm>
-            <a:off x="1875001" y="1608875"/>
-            <a:ext cx="850392" cy="0"/>
-          </a:xfrm>
-          <a:prstGeom prst="rect">
-            <a:avLst/>
-          </a:prstGeom>
-          <a:solidFill>
-            <a:schemeClr val="accent5">
-              <a:lumMod val="40000"/>
-              <a:lumOff val="60000"/>
-            </a:schemeClr>
-          </a:solidFill>
-        </p:spPr>
-        <p:style>
-          <a:lnRef idx="2">
-            <a:schemeClr val="accent1">
-              <a:shade val="50000"/>
-            </a:schemeClr>
-          </a:lnRef>
-          <a:fillRef idx="1">
-            <a:schemeClr val="accent1"/>
-          </a:fillRef>
-          <a:effectRef idx="0">
-            <a:schemeClr val="accent1"/>
-          </a:effectRef>
-          <a:fontRef idx="minor">
-            <a:schemeClr val="lt1"/>
-          </a:fontRef>
-        </p:style>
-        <p:txBody>
-          <a:bodyPr rtlCol="0" anchor="ctr"/>
-          <a:lstStyle/>
-          <a:p>
-            <a:pPr algn="ctr"/>
-            <a:endParaRPr lang="en-US"/>
-          </a:p>
-        </p:txBody>
-      </p:sp>
-      <p:sp>
-        <p:nvSpPr>
-          <p:cNvPr id="43" name="Rectangle 42">
-            <a:extLst>
-              <a:ext uri="{FF2B5EF4-FFF2-40B4-BE49-F238E27FC236}">
-                <a16:creationId xmlns:a16="http://schemas.microsoft.com/office/drawing/2014/main" id="{BE7D5406-6E75-464E-9DD6-166C5D35C21D}"/>
-              </a:ext>
-            </a:extLst>
-          </p:cNvPr>
-          <p:cNvSpPr/>
-          <p:nvPr/>
-        </p:nvSpPr>
-        <p:spPr>
-          <a:xfrm>
-            <a:off x="1865207" y="1738125"/>
-            <a:ext cx="850392" cy="0"/>
-          </a:xfrm>
-          <a:prstGeom prst="rect">
-            <a:avLst/>
-          </a:prstGeom>
-          <a:solidFill>
-            <a:schemeClr val="accent5">
-              <a:lumMod val="40000"/>
-              <a:lumOff val="60000"/>
-            </a:schemeClr>
-          </a:solidFill>
-        </p:spPr>
-        <p:style>
-          <a:lnRef idx="2">
-            <a:schemeClr val="accent1">
-              <a:shade val="50000"/>
-            </a:schemeClr>
-          </a:lnRef>
-          <a:fillRef idx="1">
-            <a:schemeClr val="accent1"/>
-          </a:fillRef>
-          <a:effectRef idx="0">
-            <a:schemeClr val="accent1"/>
-          </a:effectRef>
-          <a:fontRef idx="minor">
-            <a:schemeClr val="lt1"/>
-          </a:fontRef>
-        </p:style>
-        <p:txBody>
-          <a:bodyPr rtlCol="0" anchor="ctr"/>
-          <a:lstStyle/>
-          <a:p>
-            <a:pPr algn="ctr"/>
-            <a:endParaRPr lang="en-US"/>
-          </a:p>
-        </p:txBody>
-      </p:sp>
-      <p:sp>
-        <p:nvSpPr>
-          <p:cNvPr id="44" name="Rectangle 43">
-            <a:extLst>
-              <a:ext uri="{FF2B5EF4-FFF2-40B4-BE49-F238E27FC236}">
-                <a16:creationId xmlns:a16="http://schemas.microsoft.com/office/drawing/2014/main" id="{A0551A75-47FF-C74F-A9AE-654A6387D375}"/>
-              </a:ext>
-            </a:extLst>
-          </p:cNvPr>
-          <p:cNvSpPr/>
-          <p:nvPr/>
-        </p:nvSpPr>
-        <p:spPr>
-          <a:xfrm>
-            <a:off x="1878858" y="1851942"/>
-            <a:ext cx="839472" cy="3385609"/>
-          </a:xfrm>
-          <a:prstGeom prst="rect">
-            <a:avLst/>
-          </a:prstGeom>
-          <a:solidFill>
-            <a:schemeClr val="accent5">
-              <a:lumMod val="40000"/>
-              <a:lumOff val="60000"/>
-            </a:schemeClr>
-          </a:solidFill>
-        </p:spPr>
-        <p:style>
-          <a:lnRef idx="2">
-            <a:schemeClr val="accent1">
-              <a:shade val="50000"/>
-            </a:schemeClr>
-          </a:lnRef>
-          <a:fillRef idx="1">
-            <a:schemeClr val="accent1"/>
-          </a:fillRef>
-          <a:effectRef idx="0">
-            <a:schemeClr val="accent1"/>
-          </a:effectRef>
-          <a:fontRef idx="minor">
-            <a:schemeClr val="lt1"/>
-          </a:fontRef>
-        </p:style>
-        <p:txBody>
-          <a:bodyPr rtlCol="0" anchor="ctr"/>
-          <a:lstStyle/>
-          <a:p>
-            <a:pPr algn="ctr"/>
-            <a:endParaRPr lang="en-US"/>
-          </a:p>
-        </p:txBody>
-      </p:sp>
-      <p:sp>
-        <p:nvSpPr>
-          <p:cNvPr id="2" name="Oval 1">
-            <a:extLst>
-              <a:ext uri="{FF2B5EF4-FFF2-40B4-BE49-F238E27FC236}">
-                <a16:creationId xmlns:a16="http://schemas.microsoft.com/office/drawing/2014/main" id="{265887E1-D3A2-D849-A944-6BE597620217}"/>
-              </a:ext>
-            </a:extLst>
-          </p:cNvPr>
-          <p:cNvSpPr/>
-          <p:nvPr/>
-        </p:nvSpPr>
-        <p:spPr>
-          <a:xfrm>
-            <a:off x="1951934" y="1979582"/>
-            <a:ext cx="108354" cy="108354"/>
-          </a:xfrm>
-          <a:prstGeom prst="ellipse">
-            <a:avLst/>
-          </a:prstGeom>
-          <a:ln>
-            <a:solidFill>
-              <a:schemeClr val="accent1">
-                <a:lumMod val="50000"/>
-              </a:schemeClr>
-            </a:solidFill>
-          </a:ln>
-        </p:spPr>
-        <p:style>
-          <a:lnRef idx="2">
-            <a:schemeClr val="accent1">
-              <a:shade val="50000"/>
-            </a:schemeClr>
-          </a:lnRef>
-          <a:fillRef idx="1">
-            <a:schemeClr val="accent1"/>
-          </a:fillRef>
-          <a:effectRef idx="0">
-            <a:schemeClr val="accent1"/>
-          </a:effectRef>
-          <a:fontRef idx="minor">
-            <a:schemeClr val="lt1"/>
-          </a:fontRef>
-        </p:style>
-        <p:txBody>
-          <a:bodyPr rtlCol="0" anchor="ctr"/>
-          <a:lstStyle/>
-          <a:p>
-            <a:pPr algn="ctr"/>
-            <a:endParaRPr lang="en-US"/>
-          </a:p>
-        </p:txBody>
-      </p:sp>
-      <p:cxnSp>
-        <p:nvCxnSpPr>
-          <p:cNvPr id="8" name="Straight Connector 7">
-            <a:extLst>
-              <a:ext uri="{FF2B5EF4-FFF2-40B4-BE49-F238E27FC236}">
-                <a16:creationId xmlns:a16="http://schemas.microsoft.com/office/drawing/2014/main" id="{6C81C622-CC3A-4E4B-9AE8-F17520CC221C}"/>
-              </a:ext>
-            </a:extLst>
-          </p:cNvPr>
-          <p:cNvCxnSpPr>
-            <a:cxnSpLocks/>
-          </p:cNvCxnSpPr>
-          <p:nvPr/>
-        </p:nvCxnSpPr>
-        <p:spPr>
-          <a:xfrm>
-            <a:off x="2064153" y="2037149"/>
-            <a:ext cx="162046" cy="0"/>
-          </a:xfrm>
-          <a:prstGeom prst="line">
-            <a:avLst/>
-          </a:prstGeom>
-          <a:ln w="19050">
-            <a:solidFill>
-              <a:schemeClr val="accent1">
-                <a:lumMod val="50000"/>
-              </a:schemeClr>
-            </a:solidFill>
-          </a:ln>
-        </p:spPr>
-        <p:style>
-          <a:lnRef idx="1">
-            <a:schemeClr val="accent1"/>
-          </a:lnRef>
-          <a:fillRef idx="0">
-            <a:schemeClr val="accent1"/>
-          </a:fillRef>
-          <a:effectRef idx="0">
-            <a:schemeClr val="accent1"/>
-          </a:effectRef>
-          <a:fontRef idx="minor">
-            <a:schemeClr val="tx1"/>
-          </a:fontRef>
-        </p:style>
-      </p:cxnSp>
-      <p:sp>
-        <p:nvSpPr>
-          <p:cNvPr id="45" name="Oval 44">
-            <a:extLst>
-              <a:ext uri="{FF2B5EF4-FFF2-40B4-BE49-F238E27FC236}">
-                <a16:creationId xmlns:a16="http://schemas.microsoft.com/office/drawing/2014/main" id="{D01B33E0-1BAB-D84B-B4ED-13C644B9D7A2}"/>
-              </a:ext>
-            </a:extLst>
-          </p:cNvPr>
-          <p:cNvSpPr/>
-          <p:nvPr/>
-        </p:nvSpPr>
-        <p:spPr>
-          <a:xfrm>
-            <a:off x="1953866" y="2131982"/>
-            <a:ext cx="108354" cy="108354"/>
-          </a:xfrm>
-          <a:prstGeom prst="ellipse">
-            <a:avLst/>
-          </a:prstGeom>
-          <a:ln>
-            <a:solidFill>
-              <a:schemeClr val="accent1">
-                <a:lumMod val="50000"/>
-              </a:schemeClr>
-            </a:solidFill>
-          </a:ln>
-        </p:spPr>
-        <p:style>
-          <a:lnRef idx="2">
-            <a:schemeClr val="accent1">
-              <a:shade val="50000"/>
-            </a:schemeClr>
-          </a:lnRef>
-          <a:fillRef idx="1">
-            <a:schemeClr val="accent1"/>
-          </a:fillRef>
-          <a:effectRef idx="0">
-            <a:schemeClr val="accent1"/>
-          </a:effectRef>
-          <a:fontRef idx="minor">
-            <a:schemeClr val="lt1"/>
-          </a:fontRef>
-        </p:style>
-        <p:txBody>
-          <a:bodyPr rtlCol="0" anchor="ctr"/>
-          <a:lstStyle/>
-          <a:p>
-            <a:pPr algn="ctr"/>
-            <a:endParaRPr lang="en-US"/>
-          </a:p>
-        </p:txBody>
-      </p:sp>
-      <p:cxnSp>
-        <p:nvCxnSpPr>
-          <p:cNvPr id="46" name="Straight Connector 45">
-            <a:extLst>
-              <a:ext uri="{FF2B5EF4-FFF2-40B4-BE49-F238E27FC236}">
-                <a16:creationId xmlns:a16="http://schemas.microsoft.com/office/drawing/2014/main" id="{87D842AC-5B19-CE45-A2A5-98629065C0FB}"/>
-              </a:ext>
-            </a:extLst>
-          </p:cNvPr>
-          <p:cNvCxnSpPr>
-            <a:cxnSpLocks/>
-          </p:cNvCxnSpPr>
-          <p:nvPr/>
-        </p:nvCxnSpPr>
-        <p:spPr>
-          <a:xfrm>
-            <a:off x="2066085" y="2189549"/>
-            <a:ext cx="162046" cy="0"/>
-          </a:xfrm>
-          <a:prstGeom prst="line">
-            <a:avLst/>
-          </a:prstGeom>
-          <a:ln w="19050">
-            <a:solidFill>
-              <a:schemeClr val="accent1">
-                <a:lumMod val="50000"/>
-              </a:schemeClr>
-            </a:solidFill>
-          </a:ln>
-        </p:spPr>
-        <p:style>
-          <a:lnRef idx="1">
-            <a:schemeClr val="accent1"/>
-          </a:lnRef>
-          <a:fillRef idx="0">
-            <a:schemeClr val="accent1"/>
-          </a:fillRef>
-          <a:effectRef idx="0">
-            <a:schemeClr val="accent1"/>
-          </a:effectRef>
-          <a:fontRef idx="minor">
-            <a:schemeClr val="tx1"/>
-          </a:fontRef>
-        </p:style>
-      </p:cxnSp>
-      <p:sp>
-        <p:nvSpPr>
-          <p:cNvPr id="47" name="Oval 46">
-            <a:extLst>
-              <a:ext uri="{FF2B5EF4-FFF2-40B4-BE49-F238E27FC236}">
-                <a16:creationId xmlns:a16="http://schemas.microsoft.com/office/drawing/2014/main" id="{D70EE779-1FC3-F84B-A7A7-7FCC6EF26DE2}"/>
-              </a:ext>
-            </a:extLst>
-          </p:cNvPr>
-          <p:cNvSpPr/>
-          <p:nvPr/>
-        </p:nvSpPr>
-        <p:spPr>
-          <a:xfrm>
-            <a:off x="2167996" y="2284382"/>
-            <a:ext cx="108354" cy="108354"/>
-          </a:xfrm>
-          <a:prstGeom prst="ellipse">
-            <a:avLst/>
-          </a:prstGeom>
-          <a:ln>
-            <a:solidFill>
-              <a:schemeClr val="accent1">
-                <a:lumMod val="50000"/>
-              </a:schemeClr>
-            </a:solidFill>
-          </a:ln>
-        </p:spPr>
-        <p:style>
-          <a:lnRef idx="2">
-            <a:schemeClr val="accent1">
-              <a:shade val="50000"/>
-            </a:schemeClr>
-          </a:lnRef>
-          <a:fillRef idx="1">
-            <a:schemeClr val="accent1"/>
-          </a:fillRef>
-          <a:effectRef idx="0">
-            <a:schemeClr val="accent1"/>
-          </a:effectRef>
-          <a:fontRef idx="minor">
-            <a:schemeClr val="lt1"/>
-          </a:fontRef>
-        </p:style>
-        <p:txBody>
-          <a:bodyPr rtlCol="0" anchor="ctr"/>
-          <a:lstStyle/>
-          <a:p>
-            <a:pPr algn="ctr"/>
-            <a:endParaRPr lang="en-US"/>
-          </a:p>
-        </p:txBody>
-      </p:sp>
-      <p:cxnSp>
-        <p:nvCxnSpPr>
-          <p:cNvPr id="48" name="Straight Connector 47">
-            <a:extLst>
-              <a:ext uri="{FF2B5EF4-FFF2-40B4-BE49-F238E27FC236}">
-                <a16:creationId xmlns:a16="http://schemas.microsoft.com/office/drawing/2014/main" id="{89FE71C8-98C9-0D46-AFEE-489D1CAE4309}"/>
-              </a:ext>
-            </a:extLst>
-          </p:cNvPr>
-          <p:cNvCxnSpPr>
-            <a:cxnSpLocks/>
-          </p:cNvCxnSpPr>
-          <p:nvPr/>
-        </p:nvCxnSpPr>
-        <p:spPr>
-          <a:xfrm>
-            <a:off x="2010144" y="2341949"/>
-            <a:ext cx="162046" cy="0"/>
-          </a:xfrm>
-          <a:prstGeom prst="line">
-            <a:avLst/>
-          </a:prstGeom>
-          <a:ln w="19050">
-            <a:solidFill>
-              <a:schemeClr val="accent1">
-                <a:lumMod val="50000"/>
-              </a:schemeClr>
-            </a:solidFill>
-          </a:ln>
-        </p:spPr>
-        <p:style>
-          <a:lnRef idx="1">
-            <a:schemeClr val="accent1"/>
-          </a:lnRef>
-          <a:fillRef idx="0">
-            <a:schemeClr val="accent1"/>
-          </a:fillRef>
-          <a:effectRef idx="0">
-            <a:schemeClr val="accent1"/>
-          </a:effectRef>
-          <a:fontRef idx="minor">
-            <a:schemeClr val="tx1"/>
-          </a:fontRef>
-        </p:style>
-      </p:cxnSp>
-      <p:sp>
-        <p:nvSpPr>
-          <p:cNvPr id="49" name="Oval 48">
-            <a:extLst>
-              <a:ext uri="{FF2B5EF4-FFF2-40B4-BE49-F238E27FC236}">
-                <a16:creationId xmlns:a16="http://schemas.microsoft.com/office/drawing/2014/main" id="{6B04F19F-0CE4-6743-9597-AF1AB6043E2A}"/>
-              </a:ext>
-            </a:extLst>
-          </p:cNvPr>
-          <p:cNvSpPr/>
-          <p:nvPr/>
-        </p:nvSpPr>
-        <p:spPr>
-          <a:xfrm>
-            <a:off x="2374411" y="2436782"/>
-            <a:ext cx="108354" cy="108354"/>
-          </a:xfrm>
-          <a:prstGeom prst="ellipse">
-            <a:avLst/>
-          </a:prstGeom>
-          <a:ln>
-            <a:solidFill>
-              <a:schemeClr val="accent1">
-                <a:lumMod val="50000"/>
-              </a:schemeClr>
-            </a:solidFill>
-          </a:ln>
-        </p:spPr>
-        <p:style>
-          <a:lnRef idx="2">
-            <a:schemeClr val="accent1">
-              <a:shade val="50000"/>
-            </a:schemeClr>
-          </a:lnRef>
-          <a:fillRef idx="1">
-            <a:schemeClr val="accent1"/>
-          </a:fillRef>
-          <a:effectRef idx="0">
-            <a:schemeClr val="accent1"/>
-          </a:effectRef>
-          <a:fontRef idx="minor">
-            <a:schemeClr val="lt1"/>
-          </a:fontRef>
-        </p:style>
-        <p:txBody>
-          <a:bodyPr rtlCol="0" anchor="ctr"/>
-          <a:lstStyle/>
-          <a:p>
-            <a:pPr algn="ctr"/>
-            <a:endParaRPr lang="en-US"/>
-          </a:p>
-        </p:txBody>
-      </p:sp>
-      <p:cxnSp>
-        <p:nvCxnSpPr>
-          <p:cNvPr id="50" name="Straight Connector 49">
-            <a:extLst>
-              <a:ext uri="{FF2B5EF4-FFF2-40B4-BE49-F238E27FC236}">
-                <a16:creationId xmlns:a16="http://schemas.microsoft.com/office/drawing/2014/main" id="{2E03D552-0116-E742-AC97-C1CD93A6C3F0}"/>
-              </a:ext>
-            </a:extLst>
-          </p:cNvPr>
-          <p:cNvCxnSpPr>
-            <a:cxnSpLocks/>
-          </p:cNvCxnSpPr>
-          <p:nvPr/>
-        </p:nvCxnSpPr>
-        <p:spPr>
-          <a:xfrm>
-            <a:off x="2216559" y="2494349"/>
-            <a:ext cx="162046" cy="0"/>
-          </a:xfrm>
-          <a:prstGeom prst="line">
-            <a:avLst/>
-          </a:prstGeom>
-          <a:ln w="19050">
-            <a:solidFill>
-              <a:schemeClr val="accent1">
-                <a:lumMod val="50000"/>
-              </a:schemeClr>
-            </a:solidFill>
-          </a:ln>
-        </p:spPr>
-        <p:style>
-          <a:lnRef idx="1">
-            <a:schemeClr val="accent1"/>
-          </a:lnRef>
-          <a:fillRef idx="0">
-            <a:schemeClr val="accent1"/>
-          </a:fillRef>
-          <a:effectRef idx="0">
-            <a:schemeClr val="accent1"/>
-          </a:effectRef>
-          <a:fontRef idx="minor">
-            <a:schemeClr val="tx1"/>
-          </a:fontRef>
-        </p:style>
-      </p:cxnSp>
-      <p:sp>
-        <p:nvSpPr>
-          <p:cNvPr id="51" name="Oval 50">
-            <a:extLst>
-              <a:ext uri="{FF2B5EF4-FFF2-40B4-BE49-F238E27FC236}">
-                <a16:creationId xmlns:a16="http://schemas.microsoft.com/office/drawing/2014/main" id="{359D2E9D-2CB4-1244-88D7-881FF9FFCDE9}"/>
-              </a:ext>
-            </a:extLst>
-          </p:cNvPr>
-          <p:cNvSpPr/>
-          <p:nvPr/>
-        </p:nvSpPr>
-        <p:spPr>
-          <a:xfrm>
-            <a:off x="2372485" y="2589182"/>
-            <a:ext cx="108354" cy="108354"/>
-          </a:xfrm>
-          <a:prstGeom prst="ellipse">
-            <a:avLst/>
-          </a:prstGeom>
-          <a:ln>
-            <a:solidFill>
-              <a:schemeClr val="accent1">
-                <a:lumMod val="50000"/>
-              </a:schemeClr>
-            </a:solidFill>
-          </a:ln>
-        </p:spPr>
-        <p:style>
-          <a:lnRef idx="2">
-            <a:schemeClr val="accent1">
-              <a:shade val="50000"/>
-            </a:schemeClr>
-          </a:lnRef>
-          <a:fillRef idx="1">
-            <a:schemeClr val="accent1"/>
-          </a:fillRef>
-          <a:effectRef idx="0">
-            <a:schemeClr val="accent1"/>
-          </a:effectRef>
-          <a:fontRef idx="minor">
-            <a:schemeClr val="lt1"/>
-          </a:fontRef>
-        </p:style>
-        <p:txBody>
-          <a:bodyPr rtlCol="0" anchor="ctr"/>
-          <a:lstStyle/>
-          <a:p>
-            <a:pPr algn="ctr"/>
-            <a:endParaRPr lang="en-US"/>
-          </a:p>
-        </p:txBody>
-      </p:sp>
-      <p:cxnSp>
-        <p:nvCxnSpPr>
-          <p:cNvPr id="52" name="Straight Connector 51">
-            <a:extLst>
-              <a:ext uri="{FF2B5EF4-FFF2-40B4-BE49-F238E27FC236}">
-                <a16:creationId xmlns:a16="http://schemas.microsoft.com/office/drawing/2014/main" id="{C656BD95-32D5-3B43-B0E8-8A49C9252CC8}"/>
-              </a:ext>
-            </a:extLst>
-          </p:cNvPr>
-          <p:cNvCxnSpPr>
-            <a:cxnSpLocks/>
-          </p:cNvCxnSpPr>
-          <p:nvPr/>
-        </p:nvCxnSpPr>
-        <p:spPr>
-          <a:xfrm>
-            <a:off x="2214633" y="2646749"/>
-            <a:ext cx="162046" cy="0"/>
-          </a:xfrm>
-          <a:prstGeom prst="line">
-            <a:avLst/>
-          </a:prstGeom>
-          <a:ln w="19050">
-            <a:solidFill>
-              <a:schemeClr val="accent1">
-                <a:lumMod val="50000"/>
-              </a:schemeClr>
-            </a:solidFill>
-          </a:ln>
-        </p:spPr>
-        <p:style>
-          <a:lnRef idx="1">
-            <a:schemeClr val="accent1"/>
-          </a:lnRef>
-          <a:fillRef idx="0">
-            <a:schemeClr val="accent1"/>
-          </a:fillRef>
-          <a:effectRef idx="0">
-            <a:schemeClr val="accent1"/>
-          </a:effectRef>
-          <a:fontRef idx="minor">
-            <a:schemeClr val="tx1"/>
-          </a:fontRef>
-        </p:style>
-      </p:cxnSp>
-      <p:sp>
-        <p:nvSpPr>
-          <p:cNvPr id="53" name="Oval 52">
-            <a:extLst>
-              <a:ext uri="{FF2B5EF4-FFF2-40B4-BE49-F238E27FC236}">
-                <a16:creationId xmlns:a16="http://schemas.microsoft.com/office/drawing/2014/main" id="{8AD2799D-81E2-C141-90B3-C5CDE1C8325A}"/>
-              </a:ext>
-            </a:extLst>
-          </p:cNvPr>
-          <p:cNvSpPr/>
-          <p:nvPr/>
-        </p:nvSpPr>
-        <p:spPr>
-          <a:xfrm>
-            <a:off x="2169927" y="2737722"/>
-            <a:ext cx="108354" cy="108354"/>
-          </a:xfrm>
-          <a:prstGeom prst="ellipse">
-            <a:avLst/>
-          </a:prstGeom>
-          <a:ln>
-            <a:solidFill>
-              <a:schemeClr val="accent1">
-                <a:lumMod val="50000"/>
-              </a:schemeClr>
-            </a:solidFill>
-          </a:ln>
-        </p:spPr>
-        <p:style>
-          <a:lnRef idx="2">
-            <a:schemeClr val="accent1">
-              <a:shade val="50000"/>
-            </a:schemeClr>
-          </a:lnRef>
-          <a:fillRef idx="1">
-            <a:schemeClr val="accent1"/>
-          </a:fillRef>
-          <a:effectRef idx="0">
-            <a:schemeClr val="accent1"/>
-          </a:effectRef>
-          <a:fontRef idx="minor">
-            <a:schemeClr val="lt1"/>
-          </a:fontRef>
-        </p:style>
-        <p:txBody>
-          <a:bodyPr rtlCol="0" anchor="ctr"/>
-          <a:lstStyle/>
-          <a:p>
-            <a:pPr algn="ctr"/>
-            <a:endParaRPr lang="en-US"/>
-          </a:p>
-        </p:txBody>
-      </p:sp>
-      <p:cxnSp>
-        <p:nvCxnSpPr>
-          <p:cNvPr id="54" name="Straight Connector 53">
-            <a:extLst>
-              <a:ext uri="{FF2B5EF4-FFF2-40B4-BE49-F238E27FC236}">
-                <a16:creationId xmlns:a16="http://schemas.microsoft.com/office/drawing/2014/main" id="{29F1FBF9-A9DF-4C44-BA02-63F6A8757CC5}"/>
-              </a:ext>
-            </a:extLst>
-          </p:cNvPr>
-          <p:cNvCxnSpPr>
-            <a:cxnSpLocks/>
-          </p:cNvCxnSpPr>
-          <p:nvPr/>
-        </p:nvCxnSpPr>
-        <p:spPr>
-          <a:xfrm>
-            <a:off x="2012075" y="2795289"/>
-            <a:ext cx="162046" cy="0"/>
-          </a:xfrm>
-          <a:prstGeom prst="line">
-            <a:avLst/>
-          </a:prstGeom>
-          <a:ln w="19050">
-            <a:solidFill>
-              <a:schemeClr val="accent1">
-                <a:lumMod val="50000"/>
-              </a:schemeClr>
-            </a:solidFill>
-          </a:ln>
-        </p:spPr>
-        <p:style>
-          <a:lnRef idx="1">
-            <a:schemeClr val="accent1"/>
-          </a:lnRef>
-          <a:fillRef idx="0">
-            <a:schemeClr val="accent1"/>
-          </a:fillRef>
-          <a:effectRef idx="0">
-            <a:schemeClr val="accent1"/>
-          </a:effectRef>
-          <a:fontRef idx="minor">
-            <a:schemeClr val="tx1"/>
-          </a:fontRef>
-        </p:style>
-      </p:cxnSp>
-      <p:sp>
-        <p:nvSpPr>
-          <p:cNvPr id="55" name="Oval 54">
-            <a:extLst>
-              <a:ext uri="{FF2B5EF4-FFF2-40B4-BE49-F238E27FC236}">
-                <a16:creationId xmlns:a16="http://schemas.microsoft.com/office/drawing/2014/main" id="{3C7DCEB4-E5D5-DE4F-947D-A0D63A9E195D}"/>
-              </a:ext>
-            </a:extLst>
-          </p:cNvPr>
-          <p:cNvSpPr/>
-          <p:nvPr/>
-        </p:nvSpPr>
-        <p:spPr>
-          <a:xfrm>
-            <a:off x="1951940" y="2897840"/>
-            <a:ext cx="108354" cy="108354"/>
-          </a:xfrm>
-          <a:prstGeom prst="ellipse">
-            <a:avLst/>
-          </a:prstGeom>
-          <a:ln>
-            <a:solidFill>
-              <a:schemeClr val="accent1">
-                <a:lumMod val="50000"/>
-              </a:schemeClr>
-            </a:solidFill>
-          </a:ln>
-        </p:spPr>
-        <p:style>
-          <a:lnRef idx="2">
-            <a:schemeClr val="accent1">
-              <a:shade val="50000"/>
-            </a:schemeClr>
-          </a:lnRef>
-          <a:fillRef idx="1">
-            <a:schemeClr val="accent1"/>
-          </a:fillRef>
-          <a:effectRef idx="0">
-            <a:schemeClr val="accent1"/>
-          </a:effectRef>
-          <a:fontRef idx="minor">
-            <a:schemeClr val="lt1"/>
-          </a:fontRef>
-        </p:style>
-        <p:txBody>
-          <a:bodyPr rtlCol="0" anchor="ctr"/>
-          <a:lstStyle/>
-          <a:p>
-            <a:pPr algn="ctr"/>
-            <a:endParaRPr lang="en-US"/>
-          </a:p>
-        </p:txBody>
-      </p:sp>
-      <p:cxnSp>
-        <p:nvCxnSpPr>
-          <p:cNvPr id="56" name="Straight Connector 55">
-            <a:extLst>
-              <a:ext uri="{FF2B5EF4-FFF2-40B4-BE49-F238E27FC236}">
-                <a16:creationId xmlns:a16="http://schemas.microsoft.com/office/drawing/2014/main" id="{DACA20B8-E033-F641-8E65-B88FB80B9041}"/>
-              </a:ext>
-            </a:extLst>
-          </p:cNvPr>
-          <p:cNvCxnSpPr>
-            <a:cxnSpLocks/>
-          </p:cNvCxnSpPr>
-          <p:nvPr/>
-        </p:nvCxnSpPr>
-        <p:spPr>
-          <a:xfrm>
-            <a:off x="2064159" y="2955407"/>
-            <a:ext cx="162046" cy="0"/>
-          </a:xfrm>
-          <a:prstGeom prst="line">
-            <a:avLst/>
-          </a:prstGeom>
-          <a:ln w="19050">
-            <a:solidFill>
-              <a:schemeClr val="accent1">
-                <a:lumMod val="50000"/>
-              </a:schemeClr>
-            </a:solidFill>
-          </a:ln>
-        </p:spPr>
-        <p:style>
-          <a:lnRef idx="1">
-            <a:schemeClr val="accent1"/>
-          </a:lnRef>
-          <a:fillRef idx="0">
-            <a:schemeClr val="accent1"/>
-          </a:fillRef>
-          <a:effectRef idx="0">
-            <a:schemeClr val="accent1"/>
-          </a:effectRef>
-          <a:fontRef idx="minor">
-            <a:schemeClr val="tx1"/>
-          </a:fontRef>
-        </p:style>
-      </p:cxnSp>
-      <p:sp>
-        <p:nvSpPr>
-          <p:cNvPr id="57" name="Rectangle 56">
-            <a:extLst>
-              <a:ext uri="{FF2B5EF4-FFF2-40B4-BE49-F238E27FC236}">
-                <a16:creationId xmlns:a16="http://schemas.microsoft.com/office/drawing/2014/main" id="{2F72152E-9807-A24A-A4AF-D79D4B580E4A}"/>
-              </a:ext>
-            </a:extLst>
-          </p:cNvPr>
-          <p:cNvSpPr/>
-          <p:nvPr/>
-        </p:nvSpPr>
-        <p:spPr>
-          <a:xfrm>
-            <a:off x="3098328" y="2461384"/>
-            <a:ext cx="1907425" cy="735879"/>
-          </a:xfrm>
-          <a:prstGeom prst="rect">
-            <a:avLst/>
-          </a:prstGeom>
-          <a:solidFill>
-            <a:schemeClr val="accent5">
-              <a:lumMod val="40000"/>
-              <a:lumOff val="60000"/>
-            </a:schemeClr>
-          </a:solidFill>
-        </p:spPr>
-        <p:style>
-          <a:lnRef idx="2">
-            <a:schemeClr val="accent1">
-              <a:shade val="50000"/>
-            </a:schemeClr>
-          </a:lnRef>
-          <a:fillRef idx="1">
-            <a:schemeClr val="accent1"/>
-          </a:fillRef>
-          <a:effectRef idx="0">
-            <a:schemeClr val="accent1"/>
-          </a:effectRef>
-          <a:fontRef idx="minor">
-            <a:schemeClr val="lt1"/>
-          </a:fontRef>
-        </p:style>
-        <p:txBody>
-          <a:bodyPr rtlCol="0" anchor="ctr"/>
-          <a:lstStyle/>
-          <a:p>
-            <a:pPr algn="ctr"/>
-            <a:endParaRPr lang="en-US"/>
-          </a:p>
-        </p:txBody>
-      </p:sp>
-      <p:sp>
-        <p:nvSpPr>
-          <p:cNvPr id="58" name="Line Callout 1 57">
-            <a:extLst>
-              <a:ext uri="{FF2B5EF4-FFF2-40B4-BE49-F238E27FC236}">
-                <a16:creationId xmlns:a16="http://schemas.microsoft.com/office/drawing/2014/main" id="{F8BDE546-3DA3-9D44-AD0A-D8DEBC8B98A6}"/>
-              </a:ext>
-            </a:extLst>
-          </p:cNvPr>
-          <p:cNvSpPr/>
-          <p:nvPr/>
-        </p:nvSpPr>
-        <p:spPr>
-          <a:xfrm>
-            <a:off x="5608640" y="2327842"/>
-            <a:ext cx="1282320" cy="693575"/>
+              <a:t>Writing area</a:t>
+            </a:r>
+          </a:p>
+        </p:txBody>
+      </p:sp>
+      <p:sp>
+        <p:nvSpPr>
+          <p:cNvPr id="40" name="Line Callout 1 39">
+            <a:extLst>
+              <a:ext uri="{FF2B5EF4-FFF2-40B4-BE49-F238E27FC236}">
+                <a16:creationId xmlns:a16="http://schemas.microsoft.com/office/drawing/2014/main" id="{13A0F9F6-2457-E64B-9F4D-F9540793B366}"/>
+              </a:ext>
+            </a:extLst>
+          </p:cNvPr>
+          <p:cNvSpPr/>
+          <p:nvPr/>
+        </p:nvSpPr>
+        <p:spPr>
+          <a:xfrm>
+            <a:off x="10370600" y="4030428"/>
+            <a:ext cx="1195533" cy="385945"/>
           </a:xfrm>
           <a:prstGeom prst="borderCallout1">
             <a:avLst>
               <a:gd name="adj1" fmla="val 60367"/>
               <a:gd name="adj2" fmla="val -12795"/>
-              <a:gd name="adj3" fmla="val 72064"/>
-              <a:gd name="adj4" fmla="val -65867"/>
+              <a:gd name="adj3" fmla="val 295629"/>
+              <a:gd name="adj4" fmla="val -59477"/>
             </a:avLst>
           </a:prstGeom>
           <a:solidFill>
@@ -8981,34 +9753,276 @@
             <a:pPr algn="ctr"/>
             <a:r>
               <a:rPr lang="en-US" sz="1200" dirty="0"/>
-              <a:t>Modal dialog to get link, JavaScript, etc. </a:t>
-            </a:r>
-          </a:p>
-        </p:txBody>
-      </p:sp>
-      <p:sp>
-        <p:nvSpPr>
-          <p:cNvPr id="59" name="Line Callout 1 58">
-            <a:extLst>
-              <a:ext uri="{FF2B5EF4-FFF2-40B4-BE49-F238E27FC236}">
-                <a16:creationId xmlns:a16="http://schemas.microsoft.com/office/drawing/2014/main" id="{DD87AC3A-B178-E743-BD54-26184F482C78}"/>
-              </a:ext>
-            </a:extLst>
-          </p:cNvPr>
-          <p:cNvSpPr/>
-          <p:nvPr/>
-        </p:nvSpPr>
-        <p:spPr>
-          <a:xfrm>
-            <a:off x="384879" y="2969657"/>
-            <a:ext cx="1086848" cy="489901"/>
+              <a:t>Writing area info bar</a:t>
+            </a:r>
+          </a:p>
+        </p:txBody>
+      </p:sp>
+      <p:sp>
+        <p:nvSpPr>
+          <p:cNvPr id="5" name="Rectangle 4">
+            <a:extLst>
+              <a:ext uri="{FF2B5EF4-FFF2-40B4-BE49-F238E27FC236}">
+                <a16:creationId xmlns:a16="http://schemas.microsoft.com/office/drawing/2014/main" id="{8FC0257F-E0D1-F448-AEFB-0F12AF13F1C5}"/>
+              </a:ext>
+            </a:extLst>
+          </p:cNvPr>
+          <p:cNvSpPr/>
+          <p:nvPr/>
+        </p:nvSpPr>
+        <p:spPr>
+          <a:xfrm>
+            <a:off x="2366010" y="538816"/>
+            <a:ext cx="4960620" cy="287620"/>
+          </a:xfrm>
+          <a:prstGeom prst="rect">
+            <a:avLst/>
+          </a:prstGeom>
+          <a:solidFill>
+            <a:schemeClr val="bg1">
+              <a:lumMod val="95000"/>
+            </a:schemeClr>
+          </a:solidFill>
+        </p:spPr>
+        <p:style>
+          <a:lnRef idx="2">
+            <a:schemeClr val="accent1">
+              <a:shade val="50000"/>
+            </a:schemeClr>
+          </a:lnRef>
+          <a:fillRef idx="1">
+            <a:schemeClr val="accent1"/>
+          </a:fillRef>
+          <a:effectRef idx="0">
+            <a:schemeClr val="accent1"/>
+          </a:effectRef>
+          <a:fontRef idx="minor">
+            <a:schemeClr val="lt1"/>
+          </a:fontRef>
+        </p:style>
+        <p:txBody>
+          <a:bodyPr rtlCol="0" anchor="ctr"/>
+          <a:lstStyle/>
+          <a:p>
+            <a:r>
+              <a:rPr lang="en-US" sz="1150" dirty="0">
+                <a:solidFill>
+                  <a:schemeClr val="accent1">
+                    <a:lumMod val="50000"/>
+                  </a:schemeClr>
+                </a:solidFill>
+              </a:rPr>
+              <a:t>en_us:/app/home/teams/todos/assignee</a:t>
+            </a:r>
+          </a:p>
+        </p:txBody>
+      </p:sp>
+      <p:sp>
+        <p:nvSpPr>
+          <p:cNvPr id="62" name="Rectangle 61">
+            <a:extLst>
+              <a:ext uri="{FF2B5EF4-FFF2-40B4-BE49-F238E27FC236}">
+                <a16:creationId xmlns:a16="http://schemas.microsoft.com/office/drawing/2014/main" id="{D2474290-A95E-F141-937B-DB8C7B8002C1}"/>
+              </a:ext>
+            </a:extLst>
+          </p:cNvPr>
+          <p:cNvSpPr/>
+          <p:nvPr/>
+        </p:nvSpPr>
+        <p:spPr>
+          <a:xfrm>
+            <a:off x="365760" y="538816"/>
+            <a:ext cx="628931" cy="287620"/>
+          </a:xfrm>
+          <a:prstGeom prst="rect">
+            <a:avLst/>
+          </a:prstGeom>
+          <a:solidFill>
+            <a:schemeClr val="accent4">
+              <a:lumMod val="20000"/>
+              <a:lumOff val="80000"/>
+            </a:schemeClr>
+          </a:solidFill>
+        </p:spPr>
+        <p:style>
+          <a:lnRef idx="2">
+            <a:schemeClr val="accent1">
+              <a:shade val="50000"/>
+            </a:schemeClr>
+          </a:lnRef>
+          <a:fillRef idx="1">
+            <a:schemeClr val="accent1"/>
+          </a:fillRef>
+          <a:effectRef idx="0">
+            <a:schemeClr val="accent1"/>
+          </a:effectRef>
+          <a:fontRef idx="minor">
+            <a:schemeClr val="lt1"/>
+          </a:fontRef>
+        </p:style>
+        <p:txBody>
+          <a:bodyPr rtlCol="0" anchor="ctr"/>
+          <a:lstStyle/>
+          <a:p>
+            <a:pPr algn="ctr"/>
+            <a:r>
+              <a:rPr lang="en-US" sz="1000" dirty="0">
+                <a:solidFill>
+                  <a:schemeClr val="accent1">
+                    <a:lumMod val="50000"/>
+                  </a:schemeClr>
+                </a:solidFill>
+              </a:rPr>
+              <a:t>Docs</a:t>
+            </a:r>
+          </a:p>
+        </p:txBody>
+      </p:sp>
+      <p:sp>
+        <p:nvSpPr>
+          <p:cNvPr id="63" name="Rectangle 62">
+            <a:extLst>
+              <a:ext uri="{FF2B5EF4-FFF2-40B4-BE49-F238E27FC236}">
+                <a16:creationId xmlns:a16="http://schemas.microsoft.com/office/drawing/2014/main" id="{4B7A7619-40D3-AD48-8282-E2FBB3FE83A1}"/>
+              </a:ext>
+            </a:extLst>
+          </p:cNvPr>
+          <p:cNvSpPr/>
+          <p:nvPr/>
+        </p:nvSpPr>
+        <p:spPr>
+          <a:xfrm>
+            <a:off x="987348" y="531196"/>
+            <a:ext cx="628931" cy="287620"/>
+          </a:xfrm>
+          <a:prstGeom prst="rect">
+            <a:avLst/>
+          </a:prstGeom>
+          <a:solidFill>
+            <a:schemeClr val="accent1">
+              <a:lumMod val="40000"/>
+              <a:lumOff val="60000"/>
+            </a:schemeClr>
+          </a:solidFill>
+        </p:spPr>
+        <p:style>
+          <a:lnRef idx="2">
+            <a:schemeClr val="accent1">
+              <a:shade val="50000"/>
+            </a:schemeClr>
+          </a:lnRef>
+          <a:fillRef idx="1">
+            <a:schemeClr val="accent1"/>
+          </a:fillRef>
+          <a:effectRef idx="0">
+            <a:schemeClr val="accent1"/>
+          </a:effectRef>
+          <a:fontRef idx="minor">
+            <a:schemeClr val="lt1"/>
+          </a:fontRef>
+        </p:style>
+        <p:txBody>
+          <a:bodyPr rtlCol="0" anchor="ctr"/>
+          <a:lstStyle/>
+          <a:p>
+            <a:pPr algn="ctr"/>
+            <a:r>
+              <a:rPr lang="en-US" sz="1000" dirty="0">
+                <a:solidFill>
+                  <a:schemeClr val="accent1">
+                    <a:lumMod val="50000"/>
+                  </a:schemeClr>
+                </a:solidFill>
+              </a:rPr>
+              <a:t>Labels</a:t>
+            </a:r>
+          </a:p>
+        </p:txBody>
+      </p:sp>
+      <p:sp>
+        <p:nvSpPr>
+          <p:cNvPr id="64" name="Rectangle 63">
+            <a:extLst>
+              <a:ext uri="{FF2B5EF4-FFF2-40B4-BE49-F238E27FC236}">
+                <a16:creationId xmlns:a16="http://schemas.microsoft.com/office/drawing/2014/main" id="{483D7187-5E47-0342-B028-F345CA0A2AD1}"/>
+              </a:ext>
+            </a:extLst>
+          </p:cNvPr>
+          <p:cNvSpPr/>
+          <p:nvPr/>
+        </p:nvSpPr>
+        <p:spPr>
+          <a:xfrm>
+            <a:off x="1619529" y="535006"/>
+            <a:ext cx="628931" cy="287620"/>
+          </a:xfrm>
+          <a:prstGeom prst="rect">
+            <a:avLst/>
+          </a:prstGeom>
+          <a:solidFill>
+            <a:schemeClr val="accent1">
+              <a:lumMod val="40000"/>
+              <a:lumOff val="60000"/>
+            </a:schemeClr>
+          </a:solidFill>
+        </p:spPr>
+        <p:style>
+          <a:lnRef idx="2">
+            <a:schemeClr val="accent1">
+              <a:shade val="50000"/>
+            </a:schemeClr>
+          </a:lnRef>
+          <a:fillRef idx="1">
+            <a:schemeClr val="accent1"/>
+          </a:fillRef>
+          <a:effectRef idx="0">
+            <a:schemeClr val="accent1"/>
+          </a:effectRef>
+          <a:fontRef idx="minor">
+            <a:schemeClr val="lt1"/>
+          </a:fontRef>
+        </p:style>
+        <p:txBody>
+          <a:bodyPr rtlCol="0" anchor="ctr"/>
+          <a:lstStyle/>
+          <a:p>
+            <a:pPr algn="ctr"/>
+            <a:r>
+              <a:rPr lang="en-US" sz="1000" dirty="0">
+                <a:solidFill>
+                  <a:schemeClr val="accent1">
+                    <a:lumMod val="50000"/>
+                  </a:schemeClr>
+                </a:solidFill>
+              </a:rPr>
+              <a:t>Tokens</a:t>
+            </a:r>
+          </a:p>
+        </p:txBody>
+      </p:sp>
+      <p:sp>
+        <p:nvSpPr>
+          <p:cNvPr id="65" name="Line Callout 1 64">
+            <a:extLst>
+              <a:ext uri="{FF2B5EF4-FFF2-40B4-BE49-F238E27FC236}">
+                <a16:creationId xmlns:a16="http://schemas.microsoft.com/office/drawing/2014/main" id="{7EA8C2A1-1998-014A-ADF6-B39FACA68E5A}"/>
+              </a:ext>
+            </a:extLst>
+          </p:cNvPr>
+          <p:cNvSpPr/>
+          <p:nvPr/>
+        </p:nvSpPr>
+        <p:spPr>
+          <a:xfrm>
+            <a:off x="4625262" y="1615451"/>
+            <a:ext cx="1195533" cy="385945"/>
           </a:xfrm>
           <a:prstGeom prst="borderCallout1">
             <a:avLst>
-              <a:gd name="adj1" fmla="val 53188"/>
-              <a:gd name="adj2" fmla="val 106933"/>
-              <a:gd name="adj3" fmla="val 16846"/>
-              <a:gd name="adj4" fmla="val 156331"/>
+              <a:gd name="adj1" fmla="val 60367"/>
+              <a:gd name="adj2" fmla="val -12795"/>
+              <a:gd name="adj3" fmla="val -166375"/>
+              <a:gd name="adj4" fmla="val -29839"/>
             </a:avLst>
           </a:prstGeom>
           <a:solidFill>
@@ -9043,7 +10057,7 @@
             <a:pPr algn="ctr"/>
             <a:r>
               <a:rPr lang="en-US" sz="1200" dirty="0"/>
-              <a:t>Drag and drop content tree </a:t>
+              <a:t>Writing area address bar</a:t>
             </a:r>
           </a:p>
         </p:txBody>
@@ -9051,7 +10065,1124 @@
     </p:spTree>
     <p:extLst>
       <p:ext uri="{BB962C8B-B14F-4D97-AF65-F5344CB8AC3E}">
-        <p14:creationId xmlns:p14="http://schemas.microsoft.com/office/powerpoint/2010/main" val="2900343637"/>
+        <p14:creationId xmlns:p14="http://schemas.microsoft.com/office/powerpoint/2010/main" val="2674689192"/>
+      </p:ext>
+    </p:extLst>
+  </p:cSld>
+  <p:clrMapOvr>
+    <a:masterClrMapping/>
+  </p:clrMapOvr>
+</p:sld>
+</file>
+
+<file path=ppt/slides/slide7.xml><?xml version="1.0" encoding="utf-8"?>
+<p:sld xmlns:a="http://schemas.openxmlformats.org/drawingml/2006/main" xmlns:r="http://schemas.openxmlformats.org/officeDocument/2006/relationships" xmlns:p="http://schemas.openxmlformats.org/presentationml/2006/main">
+  <p:cSld>
+    <p:spTree>
+      <p:nvGrpSpPr>
+        <p:cNvPr id="1" name=""/>
+        <p:cNvGrpSpPr/>
+        <p:nvPr/>
+      </p:nvGrpSpPr>
+      <p:grpSpPr>
+        <a:xfrm>
+          <a:off x="0" y="0"/>
+          <a:ext cx="0" cy="0"/>
+          <a:chOff x="0" y="0"/>
+          <a:chExt cx="0" cy="0"/>
+        </a:xfrm>
+      </p:grpSpPr>
+      <p:sp>
+        <p:nvSpPr>
+          <p:cNvPr id="29" name="Rectangle 28">
+            <a:extLst>
+              <a:ext uri="{FF2B5EF4-FFF2-40B4-BE49-F238E27FC236}">
+                <a16:creationId xmlns:a16="http://schemas.microsoft.com/office/drawing/2014/main" id="{A3B64C9E-0E58-7B4F-B915-7C462DA0CD3E}"/>
+              </a:ext>
+            </a:extLst>
+          </p:cNvPr>
+          <p:cNvSpPr/>
+          <p:nvPr/>
+        </p:nvSpPr>
+        <p:spPr>
+          <a:xfrm>
+            <a:off x="508400" y="1436935"/>
+            <a:ext cx="3885180" cy="4304392"/>
+          </a:xfrm>
+          <a:prstGeom prst="rect">
+            <a:avLst/>
+          </a:prstGeom>
+          <a:gradFill flip="none" rotWithShape="1">
+            <a:gsLst>
+              <a:gs pos="0">
+                <a:srgbClr val="FCBD6A">
+                  <a:tint val="66000"/>
+                  <a:satMod val="160000"/>
+                </a:srgbClr>
+              </a:gs>
+              <a:gs pos="50000">
+                <a:srgbClr val="FCBD6A">
+                  <a:tint val="44500"/>
+                  <a:satMod val="160000"/>
+                </a:srgbClr>
+              </a:gs>
+              <a:gs pos="100000">
+                <a:srgbClr val="FCBD6A">
+                  <a:tint val="23500"/>
+                  <a:satMod val="160000"/>
+                </a:srgbClr>
+              </a:gs>
+            </a:gsLst>
+            <a:path path="circle">
+              <a:fillToRect t="100000" r="100000"/>
+            </a:path>
+            <a:tileRect l="-100000" b="-100000"/>
+          </a:gradFill>
+        </p:spPr>
+        <p:style>
+          <a:lnRef idx="2">
+            <a:schemeClr val="accent1">
+              <a:shade val="50000"/>
+            </a:schemeClr>
+          </a:lnRef>
+          <a:fillRef idx="1">
+            <a:schemeClr val="accent1"/>
+          </a:fillRef>
+          <a:effectRef idx="0">
+            <a:schemeClr val="accent1"/>
+          </a:effectRef>
+          <a:fontRef idx="minor">
+            <a:schemeClr val="lt1"/>
+          </a:fontRef>
+        </p:style>
+        <p:txBody>
+          <a:bodyPr rtlCol="0" anchor="ctr"/>
+          <a:lstStyle/>
+          <a:p>
+            <a:pPr algn="ctr"/>
+            <a:endParaRPr lang="en-US" dirty="0"/>
+          </a:p>
+        </p:txBody>
+      </p:sp>
+      <p:sp>
+        <p:nvSpPr>
+          <p:cNvPr id="31" name="Rectangle 30">
+            <a:extLst>
+              <a:ext uri="{FF2B5EF4-FFF2-40B4-BE49-F238E27FC236}">
+                <a16:creationId xmlns:a16="http://schemas.microsoft.com/office/drawing/2014/main" id="{138AAD4D-1F67-D244-89A2-060ABA94FF5D}"/>
+              </a:ext>
+            </a:extLst>
+          </p:cNvPr>
+          <p:cNvSpPr/>
+          <p:nvPr/>
+        </p:nvSpPr>
+        <p:spPr>
+          <a:xfrm>
+            <a:off x="922364" y="1680259"/>
+            <a:ext cx="3095046" cy="3734552"/>
+          </a:xfrm>
+          <a:prstGeom prst="rect">
+            <a:avLst/>
+          </a:prstGeom>
+          <a:solidFill>
+            <a:srgbClr val="FFC000"/>
+          </a:solidFill>
+        </p:spPr>
+        <p:style>
+          <a:lnRef idx="2">
+            <a:schemeClr val="accent1">
+              <a:shade val="50000"/>
+            </a:schemeClr>
+          </a:lnRef>
+          <a:fillRef idx="1">
+            <a:schemeClr val="accent1"/>
+          </a:fillRef>
+          <a:effectRef idx="0">
+            <a:schemeClr val="accent1"/>
+          </a:effectRef>
+          <a:fontRef idx="minor">
+            <a:schemeClr val="lt1"/>
+          </a:fontRef>
+        </p:style>
+        <p:txBody>
+          <a:bodyPr rtlCol="0" anchor="ctr"/>
+          <a:lstStyle/>
+          <a:p>
+            <a:pPr algn="ctr"/>
+            <a:endParaRPr lang="en-US"/>
+          </a:p>
+        </p:txBody>
+      </p:sp>
+      <p:sp>
+        <p:nvSpPr>
+          <p:cNvPr id="33" name="Rectangle 32">
+            <a:extLst>
+              <a:ext uri="{FF2B5EF4-FFF2-40B4-BE49-F238E27FC236}">
+                <a16:creationId xmlns:a16="http://schemas.microsoft.com/office/drawing/2014/main" id="{3DD6B8B1-96F3-1540-88E3-157754844EDA}"/>
+              </a:ext>
+            </a:extLst>
+          </p:cNvPr>
+          <p:cNvSpPr/>
+          <p:nvPr/>
+        </p:nvSpPr>
+        <p:spPr>
+          <a:xfrm>
+            <a:off x="908211" y="1436934"/>
+            <a:ext cx="3095046" cy="239807"/>
+          </a:xfrm>
+          <a:prstGeom prst="rect">
+            <a:avLst/>
+          </a:prstGeom>
+          <a:solidFill>
+            <a:srgbClr val="FFC000"/>
+          </a:solidFill>
+        </p:spPr>
+        <p:style>
+          <a:lnRef idx="2">
+            <a:schemeClr val="accent1">
+              <a:shade val="50000"/>
+            </a:schemeClr>
+          </a:lnRef>
+          <a:fillRef idx="1">
+            <a:schemeClr val="accent1"/>
+          </a:fillRef>
+          <a:effectRef idx="0">
+            <a:schemeClr val="accent1"/>
+          </a:effectRef>
+          <a:fontRef idx="minor">
+            <a:schemeClr val="lt1"/>
+          </a:fontRef>
+        </p:style>
+        <p:txBody>
+          <a:bodyPr rtlCol="0" anchor="ctr"/>
+          <a:lstStyle/>
+          <a:p>
+            <a:pPr algn="ctr"/>
+            <a:endParaRPr lang="en-US"/>
+          </a:p>
+        </p:txBody>
+      </p:sp>
+      <p:sp>
+        <p:nvSpPr>
+          <p:cNvPr id="35" name="Rectangle 34">
+            <a:extLst>
+              <a:ext uri="{FF2B5EF4-FFF2-40B4-BE49-F238E27FC236}">
+                <a16:creationId xmlns:a16="http://schemas.microsoft.com/office/drawing/2014/main" id="{2AD389EC-1144-034A-B912-2F9D3FF56433}"/>
+              </a:ext>
+            </a:extLst>
+          </p:cNvPr>
+          <p:cNvSpPr/>
+          <p:nvPr/>
+        </p:nvSpPr>
+        <p:spPr>
+          <a:xfrm>
+            <a:off x="908211" y="5457083"/>
+            <a:ext cx="3122700" cy="284243"/>
+          </a:xfrm>
+          <a:prstGeom prst="rect">
+            <a:avLst/>
+          </a:prstGeom>
+          <a:solidFill>
+            <a:srgbClr val="FFC000"/>
+          </a:solidFill>
+        </p:spPr>
+        <p:style>
+          <a:lnRef idx="2">
+            <a:schemeClr val="accent1">
+              <a:shade val="50000"/>
+            </a:schemeClr>
+          </a:lnRef>
+          <a:fillRef idx="1">
+            <a:schemeClr val="accent1"/>
+          </a:fillRef>
+          <a:effectRef idx="0">
+            <a:schemeClr val="accent1"/>
+          </a:effectRef>
+          <a:fontRef idx="minor">
+            <a:schemeClr val="lt1"/>
+          </a:fontRef>
+        </p:style>
+        <p:txBody>
+          <a:bodyPr rtlCol="0" anchor="ctr"/>
+          <a:lstStyle/>
+          <a:p>
+            <a:pPr algn="ctr"/>
+            <a:endParaRPr lang="en-US"/>
+          </a:p>
+        </p:txBody>
+      </p:sp>
+      <p:sp>
+        <p:nvSpPr>
+          <p:cNvPr id="21" name="Rectangle 20">
+            <a:extLst>
+              <a:ext uri="{FF2B5EF4-FFF2-40B4-BE49-F238E27FC236}">
+                <a16:creationId xmlns:a16="http://schemas.microsoft.com/office/drawing/2014/main" id="{5113ECAA-9663-C24F-A79A-CA9E4C9E57FE}"/>
+              </a:ext>
+            </a:extLst>
+          </p:cNvPr>
+          <p:cNvSpPr/>
+          <p:nvPr/>
+        </p:nvSpPr>
+        <p:spPr>
+          <a:xfrm>
+            <a:off x="910138" y="1693857"/>
+            <a:ext cx="3093119" cy="150778"/>
+          </a:xfrm>
+          <a:prstGeom prst="rect">
+            <a:avLst/>
+          </a:prstGeom>
+          <a:solidFill>
+            <a:srgbClr val="FF8F7D"/>
+          </a:solidFill>
+        </p:spPr>
+        <p:style>
+          <a:lnRef idx="2">
+            <a:schemeClr val="accent1">
+              <a:shade val="50000"/>
+            </a:schemeClr>
+          </a:lnRef>
+          <a:fillRef idx="1">
+            <a:schemeClr val="accent1"/>
+          </a:fillRef>
+          <a:effectRef idx="0">
+            <a:schemeClr val="accent1"/>
+          </a:effectRef>
+          <a:fontRef idx="minor">
+            <a:schemeClr val="lt1"/>
+          </a:fontRef>
+        </p:style>
+        <p:txBody>
+          <a:bodyPr rtlCol="0" anchor="ctr"/>
+          <a:lstStyle/>
+          <a:p>
+            <a:pPr algn="ctr"/>
+            <a:endParaRPr lang="en-US"/>
+          </a:p>
+        </p:txBody>
+      </p:sp>
+      <p:sp>
+        <p:nvSpPr>
+          <p:cNvPr id="36" name="Rectangle 35">
+            <a:extLst>
+              <a:ext uri="{FF2B5EF4-FFF2-40B4-BE49-F238E27FC236}">
+                <a16:creationId xmlns:a16="http://schemas.microsoft.com/office/drawing/2014/main" id="{ABE50C39-D2A7-314C-8EAA-182EB48AF90B}"/>
+              </a:ext>
+            </a:extLst>
+          </p:cNvPr>
+          <p:cNvSpPr/>
+          <p:nvPr/>
+        </p:nvSpPr>
+        <p:spPr>
+          <a:xfrm>
+            <a:off x="290707" y="451921"/>
+            <a:ext cx="7153752" cy="442049"/>
+          </a:xfrm>
+          <a:prstGeom prst="rect">
+            <a:avLst/>
+          </a:prstGeom>
+          <a:solidFill>
+            <a:srgbClr val="FF8F7D"/>
+          </a:solidFill>
+        </p:spPr>
+        <p:style>
+          <a:lnRef idx="2">
+            <a:schemeClr val="accent1">
+              <a:shade val="50000"/>
+            </a:schemeClr>
+          </a:lnRef>
+          <a:fillRef idx="1">
+            <a:schemeClr val="accent1"/>
+          </a:fillRef>
+          <a:effectRef idx="0">
+            <a:schemeClr val="accent1"/>
+          </a:effectRef>
+          <a:fontRef idx="minor">
+            <a:schemeClr val="lt1"/>
+          </a:fontRef>
+        </p:style>
+        <p:txBody>
+          <a:bodyPr rtlCol="0" anchor="ctr"/>
+          <a:lstStyle/>
+          <a:p>
+            <a:pPr algn="ctr"/>
+            <a:endParaRPr lang="en-US"/>
+          </a:p>
+        </p:txBody>
+      </p:sp>
+      <p:sp>
+        <p:nvSpPr>
+          <p:cNvPr id="39" name="Rectangle 38">
+            <a:extLst>
+              <a:ext uri="{FF2B5EF4-FFF2-40B4-BE49-F238E27FC236}">
+                <a16:creationId xmlns:a16="http://schemas.microsoft.com/office/drawing/2014/main" id="{0654EF2D-BF03-F643-83B4-A04CACA07848}"/>
+              </a:ext>
+            </a:extLst>
+          </p:cNvPr>
+          <p:cNvSpPr/>
+          <p:nvPr/>
+        </p:nvSpPr>
+        <p:spPr>
+          <a:xfrm>
+            <a:off x="922363" y="5237048"/>
+            <a:ext cx="3080894" cy="190376"/>
+          </a:xfrm>
+          <a:prstGeom prst="rect">
+            <a:avLst/>
+          </a:prstGeom>
+          <a:solidFill>
+            <a:srgbClr val="FF8F7D"/>
+          </a:solidFill>
+        </p:spPr>
+        <p:style>
+          <a:lnRef idx="2">
+            <a:schemeClr val="accent1">
+              <a:shade val="50000"/>
+            </a:schemeClr>
+          </a:lnRef>
+          <a:fillRef idx="1">
+            <a:schemeClr val="accent1"/>
+          </a:fillRef>
+          <a:effectRef idx="0">
+            <a:schemeClr val="accent1"/>
+          </a:effectRef>
+          <a:fontRef idx="minor">
+            <a:schemeClr val="lt1"/>
+          </a:fontRef>
+        </p:style>
+        <p:txBody>
+          <a:bodyPr rtlCol="0" anchor="ctr"/>
+          <a:lstStyle/>
+          <a:p>
+            <a:pPr algn="ctr"/>
+            <a:endParaRPr lang="en-US"/>
+          </a:p>
+        </p:txBody>
+      </p:sp>
+      <p:sp>
+        <p:nvSpPr>
+          <p:cNvPr id="20" name="Rectangle 19">
+            <a:extLst>
+              <a:ext uri="{FF2B5EF4-FFF2-40B4-BE49-F238E27FC236}">
+                <a16:creationId xmlns:a16="http://schemas.microsoft.com/office/drawing/2014/main" id="{D6D768A8-5BD0-B949-847B-38A3092EDF71}"/>
+              </a:ext>
+            </a:extLst>
+          </p:cNvPr>
+          <p:cNvSpPr/>
+          <p:nvPr/>
+        </p:nvSpPr>
+        <p:spPr>
+          <a:xfrm>
+            <a:off x="908211" y="1847268"/>
+            <a:ext cx="3095046" cy="3447767"/>
+          </a:xfrm>
+          <a:prstGeom prst="rect">
+            <a:avLst/>
+          </a:prstGeom>
+          <a:solidFill>
+            <a:schemeClr val="bg1">
+              <a:lumMod val="95000"/>
+            </a:schemeClr>
+          </a:solidFill>
+        </p:spPr>
+        <p:style>
+          <a:lnRef idx="2">
+            <a:schemeClr val="accent1">
+              <a:shade val="50000"/>
+            </a:schemeClr>
+          </a:lnRef>
+          <a:fillRef idx="1">
+            <a:schemeClr val="accent1"/>
+          </a:fillRef>
+          <a:effectRef idx="0">
+            <a:schemeClr val="accent1"/>
+          </a:effectRef>
+          <a:fontRef idx="minor">
+            <a:schemeClr val="lt1"/>
+          </a:fontRef>
+        </p:style>
+        <p:txBody>
+          <a:bodyPr rtlCol="0" anchor="ctr"/>
+          <a:lstStyle/>
+          <a:p>
+            <a:pPr algn="ctr"/>
+            <a:endParaRPr lang="en-US"/>
+          </a:p>
+        </p:txBody>
+      </p:sp>
+      <p:sp>
+        <p:nvSpPr>
+          <p:cNvPr id="5" name="Rectangle 4">
+            <a:extLst>
+              <a:ext uri="{FF2B5EF4-FFF2-40B4-BE49-F238E27FC236}">
+                <a16:creationId xmlns:a16="http://schemas.microsoft.com/office/drawing/2014/main" id="{8FC0257F-E0D1-F448-AEFB-0F12AF13F1C5}"/>
+              </a:ext>
+            </a:extLst>
+          </p:cNvPr>
+          <p:cNvSpPr/>
+          <p:nvPr/>
+        </p:nvSpPr>
+        <p:spPr>
+          <a:xfrm>
+            <a:off x="2366010" y="538816"/>
+            <a:ext cx="4960620" cy="287620"/>
+          </a:xfrm>
+          <a:prstGeom prst="rect">
+            <a:avLst/>
+          </a:prstGeom>
+          <a:solidFill>
+            <a:schemeClr val="bg1">
+              <a:lumMod val="95000"/>
+            </a:schemeClr>
+          </a:solidFill>
+        </p:spPr>
+        <p:style>
+          <a:lnRef idx="2">
+            <a:schemeClr val="accent1">
+              <a:shade val="50000"/>
+            </a:schemeClr>
+          </a:lnRef>
+          <a:fillRef idx="1">
+            <a:schemeClr val="accent1"/>
+          </a:fillRef>
+          <a:effectRef idx="0">
+            <a:schemeClr val="accent1"/>
+          </a:effectRef>
+          <a:fontRef idx="minor">
+            <a:schemeClr val="lt1"/>
+          </a:fontRef>
+        </p:style>
+        <p:txBody>
+          <a:bodyPr rtlCol="0" anchor="ctr"/>
+          <a:lstStyle/>
+          <a:p>
+            <a:r>
+              <a:rPr lang="en-US" sz="1150" dirty="0">
+                <a:solidFill>
+                  <a:schemeClr val="accent1">
+                    <a:lumMod val="50000"/>
+                  </a:schemeClr>
+                </a:solidFill>
+              </a:rPr>
+              <a:t>en_us:/app/home/teams/todos/assignee</a:t>
+            </a:r>
+          </a:p>
+        </p:txBody>
+      </p:sp>
+      <p:sp>
+        <p:nvSpPr>
+          <p:cNvPr id="62" name="Rectangle 61">
+            <a:extLst>
+              <a:ext uri="{FF2B5EF4-FFF2-40B4-BE49-F238E27FC236}">
+                <a16:creationId xmlns:a16="http://schemas.microsoft.com/office/drawing/2014/main" id="{D2474290-A95E-F141-937B-DB8C7B8002C1}"/>
+              </a:ext>
+            </a:extLst>
+          </p:cNvPr>
+          <p:cNvSpPr/>
+          <p:nvPr/>
+        </p:nvSpPr>
+        <p:spPr>
+          <a:xfrm>
+            <a:off x="365760" y="538816"/>
+            <a:ext cx="628931" cy="287620"/>
+          </a:xfrm>
+          <a:prstGeom prst="rect">
+            <a:avLst/>
+          </a:prstGeom>
+          <a:solidFill>
+            <a:schemeClr val="accent4">
+              <a:lumMod val="20000"/>
+              <a:lumOff val="80000"/>
+            </a:schemeClr>
+          </a:solidFill>
+        </p:spPr>
+        <p:style>
+          <a:lnRef idx="2">
+            <a:schemeClr val="accent1">
+              <a:shade val="50000"/>
+            </a:schemeClr>
+          </a:lnRef>
+          <a:fillRef idx="1">
+            <a:schemeClr val="accent1"/>
+          </a:fillRef>
+          <a:effectRef idx="0">
+            <a:schemeClr val="accent1"/>
+          </a:effectRef>
+          <a:fontRef idx="minor">
+            <a:schemeClr val="lt1"/>
+          </a:fontRef>
+        </p:style>
+        <p:txBody>
+          <a:bodyPr rtlCol="0" anchor="ctr"/>
+          <a:lstStyle/>
+          <a:p>
+            <a:pPr algn="ctr"/>
+            <a:r>
+              <a:rPr lang="en-US" sz="1000" dirty="0">
+                <a:solidFill>
+                  <a:schemeClr val="accent1">
+                    <a:lumMod val="50000"/>
+                  </a:schemeClr>
+                </a:solidFill>
+              </a:rPr>
+              <a:t>Docs</a:t>
+            </a:r>
+          </a:p>
+        </p:txBody>
+      </p:sp>
+      <p:sp>
+        <p:nvSpPr>
+          <p:cNvPr id="63" name="Rectangle 62">
+            <a:extLst>
+              <a:ext uri="{FF2B5EF4-FFF2-40B4-BE49-F238E27FC236}">
+                <a16:creationId xmlns:a16="http://schemas.microsoft.com/office/drawing/2014/main" id="{4B7A7619-40D3-AD48-8282-E2FBB3FE83A1}"/>
+              </a:ext>
+            </a:extLst>
+          </p:cNvPr>
+          <p:cNvSpPr/>
+          <p:nvPr/>
+        </p:nvSpPr>
+        <p:spPr>
+          <a:xfrm>
+            <a:off x="987348" y="531196"/>
+            <a:ext cx="628931" cy="287620"/>
+          </a:xfrm>
+          <a:prstGeom prst="rect">
+            <a:avLst/>
+          </a:prstGeom>
+          <a:solidFill>
+            <a:schemeClr val="accent1">
+              <a:lumMod val="40000"/>
+              <a:lumOff val="60000"/>
+            </a:schemeClr>
+          </a:solidFill>
+        </p:spPr>
+        <p:style>
+          <a:lnRef idx="2">
+            <a:schemeClr val="accent1">
+              <a:shade val="50000"/>
+            </a:schemeClr>
+          </a:lnRef>
+          <a:fillRef idx="1">
+            <a:schemeClr val="accent1"/>
+          </a:fillRef>
+          <a:effectRef idx="0">
+            <a:schemeClr val="accent1"/>
+          </a:effectRef>
+          <a:fontRef idx="minor">
+            <a:schemeClr val="lt1"/>
+          </a:fontRef>
+        </p:style>
+        <p:txBody>
+          <a:bodyPr rtlCol="0" anchor="ctr"/>
+          <a:lstStyle/>
+          <a:p>
+            <a:pPr algn="ctr"/>
+            <a:r>
+              <a:rPr lang="en-US" sz="1000" dirty="0">
+                <a:solidFill>
+                  <a:schemeClr val="accent1">
+                    <a:lumMod val="50000"/>
+                  </a:schemeClr>
+                </a:solidFill>
+              </a:rPr>
+              <a:t>Labels</a:t>
+            </a:r>
+          </a:p>
+        </p:txBody>
+      </p:sp>
+      <p:sp>
+        <p:nvSpPr>
+          <p:cNvPr id="64" name="Rectangle 63">
+            <a:extLst>
+              <a:ext uri="{FF2B5EF4-FFF2-40B4-BE49-F238E27FC236}">
+                <a16:creationId xmlns:a16="http://schemas.microsoft.com/office/drawing/2014/main" id="{483D7187-5E47-0342-B028-F345CA0A2AD1}"/>
+              </a:ext>
+            </a:extLst>
+          </p:cNvPr>
+          <p:cNvSpPr/>
+          <p:nvPr/>
+        </p:nvSpPr>
+        <p:spPr>
+          <a:xfrm>
+            <a:off x="1619529" y="535006"/>
+            <a:ext cx="628931" cy="287620"/>
+          </a:xfrm>
+          <a:prstGeom prst="rect">
+            <a:avLst/>
+          </a:prstGeom>
+          <a:solidFill>
+            <a:schemeClr val="accent1">
+              <a:lumMod val="40000"/>
+              <a:lumOff val="60000"/>
+            </a:schemeClr>
+          </a:solidFill>
+        </p:spPr>
+        <p:style>
+          <a:lnRef idx="2">
+            <a:schemeClr val="accent1">
+              <a:shade val="50000"/>
+            </a:schemeClr>
+          </a:lnRef>
+          <a:fillRef idx="1">
+            <a:schemeClr val="accent1"/>
+          </a:fillRef>
+          <a:effectRef idx="0">
+            <a:schemeClr val="accent1"/>
+          </a:effectRef>
+          <a:fontRef idx="minor">
+            <a:schemeClr val="lt1"/>
+          </a:fontRef>
+        </p:style>
+        <p:txBody>
+          <a:bodyPr rtlCol="0" anchor="ctr"/>
+          <a:lstStyle/>
+          <a:p>
+            <a:pPr algn="ctr"/>
+            <a:r>
+              <a:rPr lang="en-US" sz="1000" dirty="0">
+                <a:solidFill>
+                  <a:schemeClr val="accent1">
+                    <a:lumMod val="50000"/>
+                  </a:schemeClr>
+                </a:solidFill>
+              </a:rPr>
+              <a:t>Tokens</a:t>
+            </a:r>
+          </a:p>
+        </p:txBody>
+      </p:sp>
+      <p:pic>
+        <p:nvPicPr>
+          <p:cNvPr id="2" name="Picture 1">
+            <a:extLst>
+              <a:ext uri="{FF2B5EF4-FFF2-40B4-BE49-F238E27FC236}">
+                <a16:creationId xmlns:a16="http://schemas.microsoft.com/office/drawing/2014/main" id="{0A5B03ED-4345-A040-AFCA-FC5C55444F33}"/>
+              </a:ext>
+            </a:extLst>
+          </p:cNvPr>
+          <p:cNvPicPr>
+            <a:picLocks noChangeAspect="1"/>
+          </p:cNvPicPr>
+          <p:nvPr/>
+        </p:nvPicPr>
+        <p:blipFill>
+          <a:blip r:embed="rId2"/>
+          <a:stretch>
+            <a:fillRect/>
+          </a:stretch>
+        </p:blipFill>
+        <p:spPr>
+          <a:xfrm>
+            <a:off x="902627" y="1882853"/>
+            <a:ext cx="3115275" cy="2198494"/>
+          </a:xfrm>
+          <a:prstGeom prst="rect">
+            <a:avLst/>
+          </a:prstGeom>
+        </p:spPr>
+      </p:pic>
+      <p:sp>
+        <p:nvSpPr>
+          <p:cNvPr id="22" name="Rectangle 21">
+            <a:extLst>
+              <a:ext uri="{FF2B5EF4-FFF2-40B4-BE49-F238E27FC236}">
+                <a16:creationId xmlns:a16="http://schemas.microsoft.com/office/drawing/2014/main" id="{80FD557D-07AF-CC4A-9F26-171C08A54259}"/>
+              </a:ext>
+            </a:extLst>
+          </p:cNvPr>
+          <p:cNvSpPr/>
+          <p:nvPr/>
+        </p:nvSpPr>
+        <p:spPr>
+          <a:xfrm>
+            <a:off x="4552575" y="1436934"/>
+            <a:ext cx="3885180" cy="4304392"/>
+          </a:xfrm>
+          <a:prstGeom prst="rect">
+            <a:avLst/>
+          </a:prstGeom>
+          <a:gradFill flip="none" rotWithShape="1">
+            <a:gsLst>
+              <a:gs pos="0">
+                <a:srgbClr val="FCBD6A">
+                  <a:tint val="66000"/>
+                  <a:satMod val="160000"/>
+                </a:srgbClr>
+              </a:gs>
+              <a:gs pos="50000">
+                <a:srgbClr val="FCBD6A">
+                  <a:tint val="44500"/>
+                  <a:satMod val="160000"/>
+                </a:srgbClr>
+              </a:gs>
+              <a:gs pos="100000">
+                <a:srgbClr val="FCBD6A">
+                  <a:tint val="23500"/>
+                  <a:satMod val="160000"/>
+                </a:srgbClr>
+              </a:gs>
+            </a:gsLst>
+            <a:path path="circle">
+              <a:fillToRect t="100000" r="100000"/>
+            </a:path>
+            <a:tileRect l="-100000" b="-100000"/>
+          </a:gradFill>
+        </p:spPr>
+        <p:style>
+          <a:lnRef idx="2">
+            <a:schemeClr val="accent1">
+              <a:shade val="50000"/>
+            </a:schemeClr>
+          </a:lnRef>
+          <a:fillRef idx="1">
+            <a:schemeClr val="accent1"/>
+          </a:fillRef>
+          <a:effectRef idx="0">
+            <a:schemeClr val="accent1"/>
+          </a:effectRef>
+          <a:fontRef idx="minor">
+            <a:schemeClr val="lt1"/>
+          </a:fontRef>
+        </p:style>
+        <p:txBody>
+          <a:bodyPr rtlCol="0" anchor="ctr"/>
+          <a:lstStyle/>
+          <a:p>
+            <a:pPr algn="ctr"/>
+            <a:endParaRPr lang="en-US" dirty="0"/>
+          </a:p>
+        </p:txBody>
+      </p:sp>
+      <p:sp>
+        <p:nvSpPr>
+          <p:cNvPr id="23" name="Rectangle 22">
+            <a:extLst>
+              <a:ext uri="{FF2B5EF4-FFF2-40B4-BE49-F238E27FC236}">
+                <a16:creationId xmlns:a16="http://schemas.microsoft.com/office/drawing/2014/main" id="{3C0EBD87-674B-4248-9D84-1ABD0EB16231}"/>
+              </a:ext>
+            </a:extLst>
+          </p:cNvPr>
+          <p:cNvSpPr/>
+          <p:nvPr/>
+        </p:nvSpPr>
+        <p:spPr>
+          <a:xfrm>
+            <a:off x="4966539" y="1680258"/>
+            <a:ext cx="3095046" cy="3734552"/>
+          </a:xfrm>
+          <a:prstGeom prst="rect">
+            <a:avLst/>
+          </a:prstGeom>
+          <a:solidFill>
+            <a:srgbClr val="FFC000"/>
+          </a:solidFill>
+        </p:spPr>
+        <p:style>
+          <a:lnRef idx="2">
+            <a:schemeClr val="accent1">
+              <a:shade val="50000"/>
+            </a:schemeClr>
+          </a:lnRef>
+          <a:fillRef idx="1">
+            <a:schemeClr val="accent1"/>
+          </a:fillRef>
+          <a:effectRef idx="0">
+            <a:schemeClr val="accent1"/>
+          </a:effectRef>
+          <a:fontRef idx="minor">
+            <a:schemeClr val="lt1"/>
+          </a:fontRef>
+        </p:style>
+        <p:txBody>
+          <a:bodyPr rtlCol="0" anchor="ctr"/>
+          <a:lstStyle/>
+          <a:p>
+            <a:pPr algn="ctr"/>
+            <a:endParaRPr lang="en-US"/>
+          </a:p>
+        </p:txBody>
+      </p:sp>
+      <p:sp>
+        <p:nvSpPr>
+          <p:cNvPr id="24" name="Rectangle 23">
+            <a:extLst>
+              <a:ext uri="{FF2B5EF4-FFF2-40B4-BE49-F238E27FC236}">
+                <a16:creationId xmlns:a16="http://schemas.microsoft.com/office/drawing/2014/main" id="{3BD46EC0-DEF5-D64A-A1E8-99A4A15D099A}"/>
+              </a:ext>
+            </a:extLst>
+          </p:cNvPr>
+          <p:cNvSpPr/>
+          <p:nvPr/>
+        </p:nvSpPr>
+        <p:spPr>
+          <a:xfrm>
+            <a:off x="4952386" y="1436933"/>
+            <a:ext cx="3095046" cy="239807"/>
+          </a:xfrm>
+          <a:prstGeom prst="rect">
+            <a:avLst/>
+          </a:prstGeom>
+          <a:solidFill>
+            <a:srgbClr val="FFC000"/>
+          </a:solidFill>
+        </p:spPr>
+        <p:style>
+          <a:lnRef idx="2">
+            <a:schemeClr val="accent1">
+              <a:shade val="50000"/>
+            </a:schemeClr>
+          </a:lnRef>
+          <a:fillRef idx="1">
+            <a:schemeClr val="accent1"/>
+          </a:fillRef>
+          <a:effectRef idx="0">
+            <a:schemeClr val="accent1"/>
+          </a:effectRef>
+          <a:fontRef idx="minor">
+            <a:schemeClr val="lt1"/>
+          </a:fontRef>
+        </p:style>
+        <p:txBody>
+          <a:bodyPr rtlCol="0" anchor="ctr"/>
+          <a:lstStyle/>
+          <a:p>
+            <a:pPr algn="ctr"/>
+            <a:endParaRPr lang="en-US"/>
+          </a:p>
+        </p:txBody>
+      </p:sp>
+      <p:sp>
+        <p:nvSpPr>
+          <p:cNvPr id="26" name="Rectangle 25">
+            <a:extLst>
+              <a:ext uri="{FF2B5EF4-FFF2-40B4-BE49-F238E27FC236}">
+                <a16:creationId xmlns:a16="http://schemas.microsoft.com/office/drawing/2014/main" id="{D8C5639E-14DD-6349-A0AE-57B03CFF3F29}"/>
+              </a:ext>
+            </a:extLst>
+          </p:cNvPr>
+          <p:cNvSpPr/>
+          <p:nvPr/>
+        </p:nvSpPr>
+        <p:spPr>
+          <a:xfrm>
+            <a:off x="4952386" y="5457082"/>
+            <a:ext cx="3122700" cy="284243"/>
+          </a:xfrm>
+          <a:prstGeom prst="rect">
+            <a:avLst/>
+          </a:prstGeom>
+          <a:solidFill>
+            <a:srgbClr val="FFC000"/>
+          </a:solidFill>
+        </p:spPr>
+        <p:style>
+          <a:lnRef idx="2">
+            <a:schemeClr val="accent1">
+              <a:shade val="50000"/>
+            </a:schemeClr>
+          </a:lnRef>
+          <a:fillRef idx="1">
+            <a:schemeClr val="accent1"/>
+          </a:fillRef>
+          <a:effectRef idx="0">
+            <a:schemeClr val="accent1"/>
+          </a:effectRef>
+          <a:fontRef idx="minor">
+            <a:schemeClr val="lt1"/>
+          </a:fontRef>
+        </p:style>
+        <p:txBody>
+          <a:bodyPr rtlCol="0" anchor="ctr"/>
+          <a:lstStyle/>
+          <a:p>
+            <a:pPr algn="ctr"/>
+            <a:endParaRPr lang="en-US"/>
+          </a:p>
+        </p:txBody>
+      </p:sp>
+      <p:sp>
+        <p:nvSpPr>
+          <p:cNvPr id="27" name="Rectangle 26">
+            <a:extLst>
+              <a:ext uri="{FF2B5EF4-FFF2-40B4-BE49-F238E27FC236}">
+                <a16:creationId xmlns:a16="http://schemas.microsoft.com/office/drawing/2014/main" id="{F35D7577-336D-A443-B7D8-EAA10F52B4DC}"/>
+              </a:ext>
+            </a:extLst>
+          </p:cNvPr>
+          <p:cNvSpPr/>
+          <p:nvPr/>
+        </p:nvSpPr>
+        <p:spPr>
+          <a:xfrm>
+            <a:off x="4954313" y="1693856"/>
+            <a:ext cx="3093119" cy="150778"/>
+          </a:xfrm>
+          <a:prstGeom prst="rect">
+            <a:avLst/>
+          </a:prstGeom>
+          <a:solidFill>
+            <a:srgbClr val="FF8F7D"/>
+          </a:solidFill>
+        </p:spPr>
+        <p:style>
+          <a:lnRef idx="2">
+            <a:schemeClr val="accent1">
+              <a:shade val="50000"/>
+            </a:schemeClr>
+          </a:lnRef>
+          <a:fillRef idx="1">
+            <a:schemeClr val="accent1"/>
+          </a:fillRef>
+          <a:effectRef idx="0">
+            <a:schemeClr val="accent1"/>
+          </a:effectRef>
+          <a:fontRef idx="minor">
+            <a:schemeClr val="lt1"/>
+          </a:fontRef>
+        </p:style>
+        <p:txBody>
+          <a:bodyPr rtlCol="0" anchor="ctr"/>
+          <a:lstStyle/>
+          <a:p>
+            <a:pPr algn="ctr"/>
+            <a:endParaRPr lang="en-US"/>
+          </a:p>
+        </p:txBody>
+      </p:sp>
+      <p:sp>
+        <p:nvSpPr>
+          <p:cNvPr id="28" name="Rectangle 27">
+            <a:extLst>
+              <a:ext uri="{FF2B5EF4-FFF2-40B4-BE49-F238E27FC236}">
+                <a16:creationId xmlns:a16="http://schemas.microsoft.com/office/drawing/2014/main" id="{3C604676-6409-A941-97D9-C896EBFD387F}"/>
+              </a:ext>
+            </a:extLst>
+          </p:cNvPr>
+          <p:cNvSpPr/>
+          <p:nvPr/>
+        </p:nvSpPr>
+        <p:spPr>
+          <a:xfrm>
+            <a:off x="4966538" y="5237047"/>
+            <a:ext cx="3080894" cy="190376"/>
+          </a:xfrm>
+          <a:prstGeom prst="rect">
+            <a:avLst/>
+          </a:prstGeom>
+          <a:solidFill>
+            <a:srgbClr val="FF8F7D"/>
+          </a:solidFill>
+        </p:spPr>
+        <p:style>
+          <a:lnRef idx="2">
+            <a:schemeClr val="accent1">
+              <a:shade val="50000"/>
+            </a:schemeClr>
+          </a:lnRef>
+          <a:fillRef idx="1">
+            <a:schemeClr val="accent1"/>
+          </a:fillRef>
+          <a:effectRef idx="0">
+            <a:schemeClr val="accent1"/>
+          </a:effectRef>
+          <a:fontRef idx="minor">
+            <a:schemeClr val="lt1"/>
+          </a:fontRef>
+        </p:style>
+        <p:txBody>
+          <a:bodyPr rtlCol="0" anchor="ctr"/>
+          <a:lstStyle/>
+          <a:p>
+            <a:pPr algn="ctr"/>
+            <a:endParaRPr lang="en-US"/>
+          </a:p>
+        </p:txBody>
+      </p:sp>
+      <p:sp>
+        <p:nvSpPr>
+          <p:cNvPr id="34" name="Rectangle 33">
+            <a:extLst>
+              <a:ext uri="{FF2B5EF4-FFF2-40B4-BE49-F238E27FC236}">
+                <a16:creationId xmlns:a16="http://schemas.microsoft.com/office/drawing/2014/main" id="{180D4975-897E-F04F-B735-8C1BFF9FF481}"/>
+              </a:ext>
+            </a:extLst>
+          </p:cNvPr>
+          <p:cNvSpPr/>
+          <p:nvPr/>
+        </p:nvSpPr>
+        <p:spPr>
+          <a:xfrm>
+            <a:off x="4952386" y="1847267"/>
+            <a:ext cx="3095046" cy="3447767"/>
+          </a:xfrm>
+          <a:prstGeom prst="rect">
+            <a:avLst/>
+          </a:prstGeom>
+          <a:solidFill>
+            <a:schemeClr val="bg1">
+              <a:lumMod val="95000"/>
+            </a:schemeClr>
+          </a:solidFill>
+        </p:spPr>
+        <p:style>
+          <a:lnRef idx="2">
+            <a:schemeClr val="accent1">
+              <a:shade val="50000"/>
+            </a:schemeClr>
+          </a:lnRef>
+          <a:fillRef idx="1">
+            <a:schemeClr val="accent1"/>
+          </a:fillRef>
+          <a:effectRef idx="0">
+            <a:schemeClr val="accent1"/>
+          </a:effectRef>
+          <a:fontRef idx="minor">
+            <a:schemeClr val="lt1"/>
+          </a:fontRef>
+        </p:style>
+        <p:txBody>
+          <a:bodyPr rtlCol="0" anchor="ctr"/>
+          <a:lstStyle/>
+          <a:p>
+            <a:pPr algn="ctr"/>
+            <a:endParaRPr lang="en-US"/>
+          </a:p>
+        </p:txBody>
+      </p:sp>
+      <p:pic>
+        <p:nvPicPr>
+          <p:cNvPr id="3" name="Picture 2">
+            <a:extLst>
+              <a:ext uri="{FF2B5EF4-FFF2-40B4-BE49-F238E27FC236}">
+                <a16:creationId xmlns:a16="http://schemas.microsoft.com/office/drawing/2014/main" id="{3164BE56-B76D-9D4B-891E-4BC3B91CB0A1}"/>
+              </a:ext>
+            </a:extLst>
+          </p:cNvPr>
+          <p:cNvPicPr>
+            <a:picLocks noChangeAspect="1"/>
+          </p:cNvPicPr>
+          <p:nvPr/>
+        </p:nvPicPr>
+        <p:blipFill>
+          <a:blip r:embed="rId3"/>
+          <a:stretch>
+            <a:fillRect/>
+          </a:stretch>
+        </p:blipFill>
+        <p:spPr>
+          <a:xfrm>
+            <a:off x="4970427" y="1858232"/>
+            <a:ext cx="3093119" cy="1652395"/>
+          </a:xfrm>
+          <a:prstGeom prst="rect">
+            <a:avLst/>
+          </a:prstGeom>
+        </p:spPr>
+      </p:pic>
+    </p:spTree>
+    <p:extLst>
+      <p:ext uri="{BB962C8B-B14F-4D97-AF65-F5344CB8AC3E}">
+        <p14:creationId xmlns:p14="http://schemas.microsoft.com/office/powerpoint/2010/main" val="2365405354"/>
       </p:ext>
     </p:extLst>
   </p:cSld>

</xml_diff>